<commit_message>
Change Huffman Encoding Answer
</commit_message>
<xml_diff>
--- a/hw1/Presentation.pptx
+++ b/hw1/Presentation.pptx
@@ -21,15 +21,17 @@
     <p:sldId id="266" r:id="rId16"/>
     <p:sldId id="267" r:id="rId17"/>
     <p:sldId id="268" r:id="rId18"/>
+    <p:sldId id="269" r:id="rId19"/>
+    <p:sldId id="270" r:id="rId20"/>
   </p:sldIdLst>
   <p:sldSz cy="5143500" cx="9144000"/>
   <p:notesSz cx="6858000" cy="9144000"/>
   <p:embeddedFontLst>
     <p:embeddedFont>
       <p:font typeface="Old Standard TT"/>
-      <p:regular r:id="rId19"/>
-      <p:bold r:id="rId20"/>
-      <p:italic r:id="rId21"/>
+      <p:regular r:id="rId21"/>
+      <p:bold r:id="rId22"/>
+      <p:italic r:id="rId23"/>
     </p:embeddedFont>
   </p:embeddedFontLst>
   <p:defaultTextStyle>
@@ -486,7 +488,7 @@
   <p:cSld>
     <p:spTree>
       <p:nvGrpSpPr>
-        <p:cNvPr id="109" name="Shape 109"/>
+        <p:cNvPr id="108" name="Shape 108"/>
         <p:cNvGrpSpPr/>
         <p:nvPr/>
       </p:nvGrpSpPr>
@@ -500,7 +502,7 @@
       </p:grpSpPr>
       <p:sp>
         <p:nvSpPr>
-          <p:cNvPr id="110" name="Shape 110"/>
+          <p:cNvPr id="109" name="Shape 109"/>
           <p:cNvSpPr/>
           <p:nvPr>
             <p:ph idx="2" type="sldImg"/>
@@ -534,7 +536,7 @@
       </p:sp>
       <p:sp>
         <p:nvSpPr>
-          <p:cNvPr id="111" name="Shape 111"/>
+          <p:cNvPr id="110" name="Shape 110"/>
           <p:cNvSpPr txBox="1"/>
           <p:nvPr>
             <p:ph idx="1" type="body"/>
@@ -650,7 +652,7 @@
           </a:bodyPr>
           <a:lstStyle/>
           <a:p>
-            <a:pPr lvl="0">
+            <a:pPr lvl="0" rtl="0">
               <a:spcBef>
                 <a:spcPts val="0"/>
               </a:spcBef>
@@ -771,7 +773,7 @@
   <p:cSld>
     <p:spTree>
       <p:nvGrpSpPr>
-        <p:cNvPr id="126" name="Shape 126"/>
+        <p:cNvPr id="125" name="Shape 125"/>
         <p:cNvGrpSpPr/>
         <p:nvPr/>
       </p:nvGrpSpPr>
@@ -785,7 +787,7 @@
       </p:grpSpPr>
       <p:sp>
         <p:nvSpPr>
-          <p:cNvPr id="127" name="Shape 127"/>
+          <p:cNvPr id="126" name="Shape 126"/>
           <p:cNvSpPr/>
           <p:nvPr>
             <p:ph idx="2" type="sldImg"/>
@@ -819,7 +821,197 @@
       </p:sp>
       <p:sp>
         <p:nvSpPr>
-          <p:cNvPr id="128" name="Shape 128"/>
+          <p:cNvPr id="127" name="Shape 127"/>
+          <p:cNvSpPr txBox="1"/>
+          <p:nvPr>
+            <p:ph idx="1" type="body"/>
+          </p:nvPr>
+        </p:nvSpPr>
+        <p:spPr>
+          <a:xfrm>
+            <a:off x="685800" y="4343400"/>
+            <a:ext cx="5486400" cy="4114800"/>
+          </a:xfrm>
+          <a:prstGeom prst="rect">
+            <a:avLst/>
+          </a:prstGeom>
+        </p:spPr>
+        <p:txBody>
+          <a:bodyPr anchorCtr="0" anchor="t" bIns="91425" lIns="91425" rIns="91425" tIns="91425">
+            <a:noAutofit/>
+          </a:bodyPr>
+          <a:lstStyle/>
+          <a:p>
+            <a:pPr lvl="0">
+              <a:spcBef>
+                <a:spcPts val="0"/>
+              </a:spcBef>
+              <a:buNone/>
+            </a:pPr>
+            <a:r>
+              <a:t/>
+            </a:r>
+            <a:endParaRPr/>
+          </a:p>
+        </p:txBody>
+      </p:sp>
+    </p:spTree>
+  </p:cSld>
+  <p:clrMapOvr>
+    <a:masterClrMapping/>
+  </p:clrMapOvr>
+</p:notes>
+</file>
+
+<file path=ppt/notesSlides/notesSlide14.xml><?xml version="1.0" encoding="utf-8"?>
+<p:notes xmlns:a="http://schemas.openxmlformats.org/drawingml/2006/main" xmlns:r="http://schemas.openxmlformats.org/officeDocument/2006/relationships" xmlns:mc="http://schemas.openxmlformats.org/markup-compatibility/2006" xmlns:mv="urn:schemas-microsoft-com:mac:vml" xmlns:p="http://schemas.openxmlformats.org/presentationml/2006/main" xmlns:c="http://schemas.openxmlformats.org/drawingml/2006/chart" xmlns:dgm="http://schemas.openxmlformats.org/drawingml/2006/diagram" xmlns:o="urn:schemas-microsoft-com:office:office" xmlns:v="urn:schemas-microsoft-com:vml" xmlns:pvml="urn:schemas-microsoft-com:office:powerpoint" xmlns:com="http://schemas.openxmlformats.org/drawingml/2006/compatibility" xmlns:p14="http://schemas.microsoft.com/office/powerpoint/2010/main" showMasterPhAnim="0" showMasterSp="0">
+  <p:cSld>
+    <p:spTree>
+      <p:nvGrpSpPr>
+        <p:cNvPr id="131" name="Shape 131"/>
+        <p:cNvGrpSpPr/>
+        <p:nvPr/>
+      </p:nvGrpSpPr>
+      <p:grpSpPr>
+        <a:xfrm>
+          <a:off x="0" y="0"/>
+          <a:ext cx="0" cy="0"/>
+          <a:chOff x="0" y="0"/>
+          <a:chExt cx="0" cy="0"/>
+        </a:xfrm>
+      </p:grpSpPr>
+      <p:sp>
+        <p:nvSpPr>
+          <p:cNvPr id="132" name="Shape 132"/>
+          <p:cNvSpPr/>
+          <p:nvPr>
+            <p:ph idx="2" type="sldImg"/>
+          </p:nvPr>
+        </p:nvSpPr>
+        <p:spPr>
+          <a:xfrm>
+            <a:off x="381300" y="685800"/>
+            <a:ext cx="6096000" cy="3429000"/>
+          </a:xfrm>
+          <a:custGeom>
+            <a:pathLst>
+              <a:path extrusionOk="0" h="120000" w="120000">
+                <a:moveTo>
+                  <a:pt x="0" y="0"/>
+                </a:moveTo>
+                <a:lnTo>
+                  <a:pt x="120000" y="0"/>
+                </a:lnTo>
+                <a:lnTo>
+                  <a:pt x="120000" y="120000"/>
+                </a:lnTo>
+                <a:lnTo>
+                  <a:pt x="0" y="120000"/>
+                </a:lnTo>
+                <a:close/>
+              </a:path>
+            </a:pathLst>
+          </a:custGeom>
+        </p:spPr>
+      </p:sp>
+      <p:sp>
+        <p:nvSpPr>
+          <p:cNvPr id="133" name="Shape 133"/>
+          <p:cNvSpPr txBox="1"/>
+          <p:nvPr>
+            <p:ph idx="1" type="body"/>
+          </p:nvPr>
+        </p:nvSpPr>
+        <p:spPr>
+          <a:xfrm>
+            <a:off x="685800" y="4343400"/>
+            <a:ext cx="5486400" cy="4114800"/>
+          </a:xfrm>
+          <a:prstGeom prst="rect">
+            <a:avLst/>
+          </a:prstGeom>
+        </p:spPr>
+        <p:txBody>
+          <a:bodyPr anchorCtr="0" anchor="t" bIns="91425" lIns="91425" rIns="91425" tIns="91425">
+            <a:noAutofit/>
+          </a:bodyPr>
+          <a:lstStyle/>
+          <a:p>
+            <a:pPr lvl="0">
+              <a:spcBef>
+                <a:spcPts val="0"/>
+              </a:spcBef>
+              <a:buNone/>
+            </a:pPr>
+            <a:r>
+              <a:t/>
+            </a:r>
+            <a:endParaRPr/>
+          </a:p>
+        </p:txBody>
+      </p:sp>
+    </p:spTree>
+  </p:cSld>
+  <p:clrMapOvr>
+    <a:masterClrMapping/>
+  </p:clrMapOvr>
+</p:notes>
+</file>
+
+<file path=ppt/notesSlides/notesSlide15.xml><?xml version="1.0" encoding="utf-8"?>
+<p:notes xmlns:a="http://schemas.openxmlformats.org/drawingml/2006/main" xmlns:r="http://schemas.openxmlformats.org/officeDocument/2006/relationships" xmlns:mc="http://schemas.openxmlformats.org/markup-compatibility/2006" xmlns:mv="urn:schemas-microsoft-com:mac:vml" xmlns:p="http://schemas.openxmlformats.org/presentationml/2006/main" xmlns:c="http://schemas.openxmlformats.org/drawingml/2006/chart" xmlns:dgm="http://schemas.openxmlformats.org/drawingml/2006/diagram" xmlns:o="urn:schemas-microsoft-com:office:office" xmlns:v="urn:schemas-microsoft-com:vml" xmlns:pvml="urn:schemas-microsoft-com:office:powerpoint" xmlns:com="http://schemas.openxmlformats.org/drawingml/2006/compatibility" xmlns:p14="http://schemas.microsoft.com/office/powerpoint/2010/main" showMasterPhAnim="0" showMasterSp="0">
+  <p:cSld>
+    <p:spTree>
+      <p:nvGrpSpPr>
+        <p:cNvPr id="137" name="Shape 137"/>
+        <p:cNvGrpSpPr/>
+        <p:nvPr/>
+      </p:nvGrpSpPr>
+      <p:grpSpPr>
+        <a:xfrm>
+          <a:off x="0" y="0"/>
+          <a:ext cx="0" cy="0"/>
+          <a:chOff x="0" y="0"/>
+          <a:chExt cx="0" cy="0"/>
+        </a:xfrm>
+      </p:grpSpPr>
+      <p:sp>
+        <p:nvSpPr>
+          <p:cNvPr id="138" name="Shape 138"/>
+          <p:cNvSpPr/>
+          <p:nvPr>
+            <p:ph idx="2" type="sldImg"/>
+          </p:nvPr>
+        </p:nvSpPr>
+        <p:spPr>
+          <a:xfrm>
+            <a:off x="381300" y="685800"/>
+            <a:ext cx="6096000" cy="3429000"/>
+          </a:xfrm>
+          <a:custGeom>
+            <a:pathLst>
+              <a:path extrusionOk="0" h="120000" w="120000">
+                <a:moveTo>
+                  <a:pt x="0" y="0"/>
+                </a:moveTo>
+                <a:lnTo>
+                  <a:pt x="120000" y="0"/>
+                </a:lnTo>
+                <a:lnTo>
+                  <a:pt x="120000" y="120000"/>
+                </a:lnTo>
+                <a:lnTo>
+                  <a:pt x="0" y="120000"/>
+                </a:lnTo>
+                <a:close/>
+              </a:path>
+            </a:pathLst>
+          </a:custGeom>
+        </p:spPr>
+      </p:sp>
+      <p:sp>
+        <p:nvSpPr>
+          <p:cNvPr id="139" name="Shape 139"/>
           <p:cNvSpPr txBox="1"/>
           <p:nvPr>
             <p:ph idx="1" type="body"/>
@@ -1056,7 +1248,7 @@
   <p:cSld>
     <p:spTree>
       <p:nvGrpSpPr>
-        <p:cNvPr id="73" name="Shape 73"/>
+        <p:cNvPr id="72" name="Shape 72"/>
         <p:cNvGrpSpPr/>
         <p:nvPr/>
       </p:nvGrpSpPr>
@@ -1070,7 +1262,7 @@
       </p:grpSpPr>
       <p:sp>
         <p:nvSpPr>
-          <p:cNvPr id="74" name="Shape 74"/>
+          <p:cNvPr id="73" name="Shape 73"/>
           <p:cNvSpPr/>
           <p:nvPr>
             <p:ph idx="2" type="sldImg"/>
@@ -1104,7 +1296,7 @@
       </p:sp>
       <p:sp>
         <p:nvSpPr>
-          <p:cNvPr id="75" name="Shape 75"/>
+          <p:cNvPr id="74" name="Shape 74"/>
           <p:cNvSpPr txBox="1"/>
           <p:nvPr>
             <p:ph idx="1" type="body"/>
@@ -1151,7 +1343,7 @@
   <p:cSld>
     <p:spTree>
       <p:nvGrpSpPr>
-        <p:cNvPr id="79" name="Shape 79"/>
+        <p:cNvPr id="78" name="Shape 78"/>
         <p:cNvGrpSpPr/>
         <p:nvPr/>
       </p:nvGrpSpPr>
@@ -1165,7 +1357,7 @@
       </p:grpSpPr>
       <p:sp>
         <p:nvSpPr>
-          <p:cNvPr id="80" name="Shape 80"/>
+          <p:cNvPr id="79" name="Shape 79"/>
           <p:cNvSpPr/>
           <p:nvPr>
             <p:ph idx="2" type="sldImg"/>
@@ -1199,7 +1391,7 @@
       </p:sp>
       <p:sp>
         <p:nvSpPr>
-          <p:cNvPr id="81" name="Shape 81"/>
+          <p:cNvPr id="80" name="Shape 80"/>
           <p:cNvSpPr txBox="1"/>
           <p:nvPr>
             <p:ph idx="1" type="body"/>
@@ -1220,7 +1412,7 @@
           </a:bodyPr>
           <a:lstStyle/>
           <a:p>
-            <a:pPr lvl="0" rtl="0">
+            <a:pPr lvl="0">
               <a:spcBef>
                 <a:spcPts val="0"/>
               </a:spcBef>
@@ -1315,7 +1507,7 @@
           </a:bodyPr>
           <a:lstStyle/>
           <a:p>
-            <a:pPr lvl="0">
+            <a:pPr lvl="0" rtl="0">
               <a:spcBef>
                 <a:spcPts val="0"/>
               </a:spcBef>
@@ -1341,7 +1533,7 @@
   <p:cSld>
     <p:spTree>
       <p:nvGrpSpPr>
-        <p:cNvPr id="91" name="Shape 91"/>
+        <p:cNvPr id="90" name="Shape 90"/>
         <p:cNvGrpSpPr/>
         <p:nvPr/>
       </p:nvGrpSpPr>
@@ -1355,7 +1547,7 @@
       </p:grpSpPr>
       <p:sp>
         <p:nvSpPr>
-          <p:cNvPr id="92" name="Shape 92"/>
+          <p:cNvPr id="91" name="Shape 91"/>
           <p:cNvSpPr/>
           <p:nvPr>
             <p:ph idx="2" type="sldImg"/>
@@ -1389,7 +1581,7 @@
       </p:sp>
       <p:sp>
         <p:nvSpPr>
-          <p:cNvPr id="93" name="Shape 93"/>
+          <p:cNvPr id="92" name="Shape 92"/>
           <p:cNvSpPr txBox="1"/>
           <p:nvPr>
             <p:ph idx="1" type="body"/>
@@ -1410,7 +1602,7 @@
           </a:bodyPr>
           <a:lstStyle/>
           <a:p>
-            <a:pPr lvl="0">
+            <a:pPr lvl="0" rtl="0">
               <a:spcBef>
                 <a:spcPts val="0"/>
               </a:spcBef>
@@ -1436,7 +1628,7 @@
   <p:cSld>
     <p:spTree>
       <p:nvGrpSpPr>
-        <p:cNvPr id="97" name="Shape 97"/>
+        <p:cNvPr id="95" name="Shape 95"/>
         <p:cNvGrpSpPr/>
         <p:nvPr/>
       </p:nvGrpSpPr>
@@ -1450,7 +1642,7 @@
       </p:grpSpPr>
       <p:sp>
         <p:nvSpPr>
-          <p:cNvPr id="98" name="Shape 98"/>
+          <p:cNvPr id="96" name="Shape 96"/>
           <p:cNvSpPr/>
           <p:nvPr>
             <p:ph idx="2" type="sldImg"/>
@@ -1484,7 +1676,7 @@
       </p:sp>
       <p:sp>
         <p:nvSpPr>
-          <p:cNvPr id="99" name="Shape 99"/>
+          <p:cNvPr id="97" name="Shape 97"/>
           <p:cNvSpPr txBox="1"/>
           <p:nvPr>
             <p:ph idx="1" type="body"/>
@@ -1531,7 +1723,7 @@
   <p:cSld>
     <p:spTree>
       <p:nvGrpSpPr>
-        <p:cNvPr id="103" name="Shape 103"/>
+        <p:cNvPr id="102" name="Shape 102"/>
         <p:cNvGrpSpPr/>
         <p:nvPr/>
       </p:nvGrpSpPr>
@@ -1545,7 +1737,7 @@
       </p:grpSpPr>
       <p:sp>
         <p:nvSpPr>
-          <p:cNvPr id="104" name="Shape 104"/>
+          <p:cNvPr id="103" name="Shape 103"/>
           <p:cNvSpPr/>
           <p:nvPr>
             <p:ph idx="2" type="sldImg"/>
@@ -1579,7 +1771,7 @@
       </p:sp>
       <p:sp>
         <p:nvSpPr>
-          <p:cNvPr id="105" name="Shape 105"/>
+          <p:cNvPr id="104" name="Shape 104"/>
           <p:cNvSpPr txBox="1"/>
           <p:nvPr>
             <p:ph idx="1" type="body"/>
@@ -1600,7 +1792,7 @@
           </a:bodyPr>
           <a:lstStyle/>
           <a:p>
-            <a:pPr lvl="0" rtl="0">
+            <a:pPr lvl="0">
               <a:spcBef>
                 <a:spcPts val="0"/>
               </a:spcBef>
@@ -5580,7 +5772,7 @@
   <p:cSld>
     <p:spTree>
       <p:nvGrpSpPr>
-        <p:cNvPr id="112" name="Shape 112"/>
+        <p:cNvPr id="111" name="Shape 111"/>
         <p:cNvGrpSpPr/>
         <p:nvPr/>
       </p:nvGrpSpPr>
@@ -5594,7 +5786,7 @@
       </p:grpSpPr>
       <p:sp>
         <p:nvSpPr>
-          <p:cNvPr id="113" name="Shape 113"/>
+          <p:cNvPr id="112" name="Shape 112"/>
           <p:cNvSpPr txBox="1"/>
           <p:nvPr>
             <p:ph type="title"/>
@@ -5602,15 +5794,15 @@
         </p:nvSpPr>
         <p:spPr>
           <a:xfrm>
-            <a:off x="512700" y="1893300"/>
-            <a:ext cx="8118600" cy="1522800"/>
+            <a:off x="311700" y="445025"/>
+            <a:ext cx="8520600" cy="613200"/>
           </a:xfrm>
           <a:prstGeom prst="rect">
             <a:avLst/>
           </a:prstGeom>
         </p:spPr>
         <p:txBody>
-          <a:bodyPr anchorCtr="0" anchor="b" bIns="91425" lIns="91425" rIns="91425" tIns="91425">
+          <a:bodyPr anchorCtr="0" anchor="t" bIns="91425" lIns="91425" rIns="91425" tIns="91425">
             <a:noAutofit/>
           </a:bodyPr>
           <a:lstStyle/>
@@ -5623,8 +5815,984 @@
             </a:pPr>
             <a:r>
               <a:rPr lang="en"/>
-              <a:t>Search Engine Evaluation</a:t>
-            </a:r>
+              <a:t>Pseudo Code Cont.</a:t>
+            </a:r>
+          </a:p>
+        </p:txBody>
+      </p:sp>
+      <p:sp>
+        <p:nvSpPr>
+          <p:cNvPr id="113" name="Shape 113"/>
+          <p:cNvSpPr txBox="1"/>
+          <p:nvPr>
+            <p:ph idx="1" type="body"/>
+          </p:nvPr>
+        </p:nvSpPr>
+        <p:spPr>
+          <a:xfrm>
+            <a:off x="311700" y="1171600"/>
+            <a:ext cx="8520600" cy="3397200"/>
+          </a:xfrm>
+          <a:prstGeom prst="rect">
+            <a:avLst/>
+          </a:prstGeom>
+        </p:spPr>
+        <p:txBody>
+          <a:bodyPr anchorCtr="0" anchor="t" bIns="91425" lIns="91425" rIns="91425" tIns="91425">
+            <a:noAutofit/>
+          </a:bodyPr>
+          <a:lstStyle/>
+          <a:p>
+            <a:pPr indent="-69850" lvl="0" marL="457200">
+              <a:spcBef>
+                <a:spcPts val="0"/>
+              </a:spcBef>
+              <a:spcAft>
+                <a:spcPts val="0"/>
+              </a:spcAft>
+              <a:buClr>
+                <a:schemeClr val="dk1"/>
+              </a:buClr>
+              <a:buSzPct val="68750"/>
+              <a:buFont typeface="Arial"/>
+              <a:buNone/>
+            </a:pPr>
+            <a:r>
+              <a:rPr lang="en" sz="1600">
+                <a:solidFill>
+                  <a:srgbClr val="000088"/>
+                </a:solidFill>
+                <a:latin typeface="Consolas"/>
+                <a:ea typeface="Consolas"/>
+                <a:cs typeface="Consolas"/>
+                <a:sym typeface="Consolas"/>
+              </a:rPr>
+              <a:t>if</a:t>
+            </a:r>
+            <a:r>
+              <a:rPr lang="en" sz="1600">
+                <a:solidFill>
+                  <a:schemeClr val="dk1"/>
+                </a:solidFill>
+                <a:latin typeface="Consolas"/>
+                <a:ea typeface="Consolas"/>
+                <a:cs typeface="Consolas"/>
+                <a:sym typeface="Consolas"/>
+              </a:rPr>
+              <a:t> A</a:t>
+            </a:r>
+            <a:r>
+              <a:rPr lang="en" sz="1600">
+                <a:solidFill>
+                  <a:srgbClr val="666600"/>
+                </a:solidFill>
+                <a:latin typeface="Consolas"/>
+                <a:ea typeface="Consolas"/>
+                <a:cs typeface="Consolas"/>
+                <a:sym typeface="Consolas"/>
+              </a:rPr>
+              <a:t>[</a:t>
+            </a:r>
+            <a:r>
+              <a:rPr lang="en" sz="1600">
+                <a:solidFill>
+                  <a:schemeClr val="dk1"/>
+                </a:solidFill>
+                <a:latin typeface="Consolas"/>
+                <a:ea typeface="Consolas"/>
+                <a:cs typeface="Consolas"/>
+                <a:sym typeface="Consolas"/>
+              </a:rPr>
+              <a:t>rmed</a:t>
+            </a:r>
+            <a:r>
+              <a:rPr lang="en" sz="1600">
+                <a:solidFill>
+                  <a:srgbClr val="666600"/>
+                </a:solidFill>
+                <a:latin typeface="Consolas"/>
+                <a:ea typeface="Consolas"/>
+                <a:cs typeface="Consolas"/>
+                <a:sym typeface="Consolas"/>
+              </a:rPr>
+              <a:t>][</a:t>
+            </a:r>
+            <a:r>
+              <a:rPr lang="en" sz="1600">
+                <a:solidFill>
+                  <a:schemeClr val="dk1"/>
+                </a:solidFill>
+                <a:latin typeface="Consolas"/>
+                <a:ea typeface="Consolas"/>
+                <a:cs typeface="Consolas"/>
+                <a:sym typeface="Consolas"/>
+              </a:rPr>
+              <a:t>cmed</a:t>
+            </a:r>
+            <a:r>
+              <a:rPr lang="en" sz="1600">
+                <a:solidFill>
+                  <a:srgbClr val="666600"/>
+                </a:solidFill>
+                <a:latin typeface="Consolas"/>
+                <a:ea typeface="Consolas"/>
+                <a:cs typeface="Consolas"/>
+                <a:sym typeface="Consolas"/>
+              </a:rPr>
+              <a:t>]</a:t>
+            </a:r>
+            <a:r>
+              <a:rPr lang="en" sz="1600">
+                <a:solidFill>
+                  <a:schemeClr val="dk1"/>
+                </a:solidFill>
+                <a:latin typeface="Consolas"/>
+                <a:ea typeface="Consolas"/>
+                <a:cs typeface="Consolas"/>
+                <a:sym typeface="Consolas"/>
+              </a:rPr>
+              <a:t> </a:t>
+            </a:r>
+            <a:r>
+              <a:rPr lang="en" sz="1600">
+                <a:solidFill>
+                  <a:srgbClr val="666600"/>
+                </a:solidFill>
+                <a:latin typeface="Consolas"/>
+                <a:ea typeface="Consolas"/>
+                <a:cs typeface="Consolas"/>
+                <a:sym typeface="Consolas"/>
+              </a:rPr>
+              <a:t>&gt;</a:t>
+            </a:r>
+            <a:r>
+              <a:rPr lang="en" sz="1600">
+                <a:solidFill>
+                  <a:schemeClr val="dk1"/>
+                </a:solidFill>
+                <a:latin typeface="Consolas"/>
+                <a:ea typeface="Consolas"/>
+                <a:cs typeface="Consolas"/>
+                <a:sym typeface="Consolas"/>
+              </a:rPr>
+              <a:t> x:</a:t>
+            </a:r>
+          </a:p>
+          <a:p>
+            <a:pPr indent="-69850" lvl="0" marL="457200">
+              <a:spcBef>
+                <a:spcPts val="0"/>
+              </a:spcBef>
+              <a:spcAft>
+                <a:spcPts val="0"/>
+              </a:spcAft>
+              <a:buClr>
+                <a:schemeClr val="dk1"/>
+              </a:buClr>
+              <a:buSzPct val="68750"/>
+              <a:buFont typeface="Arial"/>
+              <a:buNone/>
+            </a:pPr>
+            <a:r>
+              <a:rPr lang="en" sz="1600">
+                <a:solidFill>
+                  <a:schemeClr val="dk1"/>
+                </a:solidFill>
+                <a:latin typeface="Consolas"/>
+                <a:ea typeface="Consolas"/>
+                <a:cs typeface="Consolas"/>
+                <a:sym typeface="Consolas"/>
+              </a:rPr>
+              <a:t>	res </a:t>
+            </a:r>
+            <a:r>
+              <a:rPr lang="en" sz="1600">
+                <a:solidFill>
+                  <a:srgbClr val="666600"/>
+                </a:solidFill>
+                <a:latin typeface="Consolas"/>
+                <a:ea typeface="Consolas"/>
+                <a:cs typeface="Consolas"/>
+                <a:sym typeface="Consolas"/>
+              </a:rPr>
+              <a:t>=</a:t>
+            </a:r>
+            <a:r>
+              <a:rPr lang="en" sz="1600">
+                <a:solidFill>
+                  <a:schemeClr val="dk1"/>
+                </a:solidFill>
+                <a:latin typeface="Consolas"/>
+                <a:ea typeface="Consolas"/>
+                <a:cs typeface="Consolas"/>
+                <a:sym typeface="Consolas"/>
+              </a:rPr>
+              <a:t> findX</a:t>
+            </a:r>
+            <a:r>
+              <a:rPr lang="en" sz="1600">
+                <a:solidFill>
+                  <a:srgbClr val="666600"/>
+                </a:solidFill>
+                <a:latin typeface="Consolas"/>
+                <a:ea typeface="Consolas"/>
+                <a:cs typeface="Consolas"/>
+                <a:sym typeface="Consolas"/>
+              </a:rPr>
+              <a:t>(</a:t>
+            </a:r>
+            <a:r>
+              <a:rPr lang="en" sz="1600">
+                <a:solidFill>
+                  <a:schemeClr val="dk1"/>
+                </a:solidFill>
+                <a:latin typeface="Consolas"/>
+                <a:ea typeface="Consolas"/>
+                <a:cs typeface="Consolas"/>
+                <a:sym typeface="Consolas"/>
+              </a:rPr>
+              <a:t>A</a:t>
+            </a:r>
+            <a:r>
+              <a:rPr lang="en" sz="1600">
+                <a:solidFill>
+                  <a:srgbClr val="666600"/>
+                </a:solidFill>
+                <a:latin typeface="Consolas"/>
+                <a:ea typeface="Consolas"/>
+                <a:cs typeface="Consolas"/>
+                <a:sym typeface="Consolas"/>
+              </a:rPr>
+              <a:t>,</a:t>
+            </a:r>
+            <a:r>
+              <a:rPr lang="en" sz="1600">
+                <a:solidFill>
+                  <a:schemeClr val="dk1"/>
+                </a:solidFill>
+                <a:latin typeface="Consolas"/>
+                <a:ea typeface="Consolas"/>
+                <a:cs typeface="Consolas"/>
+                <a:sym typeface="Consolas"/>
+              </a:rPr>
+              <a:t> r</a:t>
+            </a:r>
+            <a:r>
+              <a:rPr lang="en" sz="1600">
+                <a:solidFill>
+                  <a:srgbClr val="666600"/>
+                </a:solidFill>
+                <a:latin typeface="Consolas"/>
+                <a:ea typeface="Consolas"/>
+                <a:cs typeface="Consolas"/>
+                <a:sym typeface="Consolas"/>
+              </a:rPr>
+              <a:t>,</a:t>
+            </a:r>
+            <a:r>
+              <a:rPr lang="en" sz="1600">
+                <a:solidFill>
+                  <a:schemeClr val="dk1"/>
+                </a:solidFill>
+                <a:latin typeface="Consolas"/>
+                <a:ea typeface="Consolas"/>
+                <a:cs typeface="Consolas"/>
+                <a:sym typeface="Consolas"/>
+              </a:rPr>
+              <a:t> rmed</a:t>
+            </a:r>
+            <a:r>
+              <a:rPr lang="en" sz="1600">
+                <a:solidFill>
+                  <a:srgbClr val="666600"/>
+                </a:solidFill>
+                <a:latin typeface="Consolas"/>
+                <a:ea typeface="Consolas"/>
+                <a:cs typeface="Consolas"/>
+                <a:sym typeface="Consolas"/>
+              </a:rPr>
+              <a:t>,</a:t>
+            </a:r>
+            <a:r>
+              <a:rPr lang="en" sz="1600">
+                <a:solidFill>
+                  <a:schemeClr val="dk1"/>
+                </a:solidFill>
+                <a:latin typeface="Consolas"/>
+                <a:ea typeface="Consolas"/>
+                <a:cs typeface="Consolas"/>
+                <a:sym typeface="Consolas"/>
+              </a:rPr>
+              <a:t> c</a:t>
+            </a:r>
+            <a:r>
+              <a:rPr lang="en" sz="1600">
+                <a:solidFill>
+                  <a:srgbClr val="666600"/>
+                </a:solidFill>
+                <a:latin typeface="Consolas"/>
+                <a:ea typeface="Consolas"/>
+                <a:cs typeface="Consolas"/>
+                <a:sym typeface="Consolas"/>
+              </a:rPr>
+              <a:t>,</a:t>
+            </a:r>
+            <a:r>
+              <a:rPr lang="en" sz="1600">
+                <a:solidFill>
+                  <a:schemeClr val="dk1"/>
+                </a:solidFill>
+                <a:latin typeface="Consolas"/>
+                <a:ea typeface="Consolas"/>
+                <a:cs typeface="Consolas"/>
+                <a:sym typeface="Consolas"/>
+              </a:rPr>
+              <a:t> cmed</a:t>
+            </a:r>
+            <a:r>
+              <a:rPr lang="en" sz="1600">
+                <a:solidFill>
+                  <a:srgbClr val="666600"/>
+                </a:solidFill>
+                <a:latin typeface="Consolas"/>
+                <a:ea typeface="Consolas"/>
+                <a:cs typeface="Consolas"/>
+                <a:sym typeface="Consolas"/>
+              </a:rPr>
+              <a:t>,</a:t>
+            </a:r>
+            <a:r>
+              <a:rPr lang="en" sz="1600">
+                <a:solidFill>
+                  <a:schemeClr val="dk1"/>
+                </a:solidFill>
+                <a:latin typeface="Consolas"/>
+                <a:ea typeface="Consolas"/>
+                <a:cs typeface="Consolas"/>
+                <a:sym typeface="Consolas"/>
+              </a:rPr>
+              <a:t> x)</a:t>
+            </a:r>
+          </a:p>
+          <a:p>
+            <a:pPr indent="-69850" lvl="0" marL="457200" rtl="0">
+              <a:spcBef>
+                <a:spcPts val="0"/>
+              </a:spcBef>
+              <a:spcAft>
+                <a:spcPts val="0"/>
+              </a:spcAft>
+              <a:buClr>
+                <a:schemeClr val="dk1"/>
+              </a:buClr>
+              <a:buSzPct val="68750"/>
+              <a:buFont typeface="Arial"/>
+              <a:buNone/>
+            </a:pPr>
+            <a:r>
+              <a:rPr lang="en" sz="1600">
+                <a:solidFill>
+                  <a:schemeClr val="dk1"/>
+                </a:solidFill>
+                <a:latin typeface="Consolas"/>
+                <a:ea typeface="Consolas"/>
+                <a:cs typeface="Consolas"/>
+                <a:sym typeface="Consolas"/>
+              </a:rPr>
+              <a:t>	</a:t>
+            </a:r>
+            <a:r>
+              <a:rPr i="1" lang="en" sz="1600">
+                <a:solidFill>
+                  <a:srgbClr val="000088"/>
+                </a:solidFill>
+                <a:latin typeface="Consolas"/>
+                <a:ea typeface="Consolas"/>
+                <a:cs typeface="Consolas"/>
+                <a:sym typeface="Consolas"/>
+              </a:rPr>
+              <a:t>return res if not equal -1</a:t>
+            </a:r>
+          </a:p>
+          <a:p>
+            <a:pPr indent="-69850" lvl="0" marL="457200">
+              <a:spcBef>
+                <a:spcPts val="0"/>
+              </a:spcBef>
+              <a:spcAft>
+                <a:spcPts val="0"/>
+              </a:spcAft>
+              <a:buClr>
+                <a:schemeClr val="dk1"/>
+              </a:buClr>
+              <a:buSzPct val="68750"/>
+              <a:buFont typeface="Arial"/>
+              <a:buNone/>
+            </a:pPr>
+            <a:r>
+              <a:rPr lang="en" sz="1600">
+                <a:solidFill>
+                  <a:schemeClr val="dk1"/>
+                </a:solidFill>
+                <a:latin typeface="Consolas"/>
+                <a:ea typeface="Consolas"/>
+                <a:cs typeface="Consolas"/>
+                <a:sym typeface="Consolas"/>
+              </a:rPr>
+              <a:t>	res </a:t>
+            </a:r>
+            <a:r>
+              <a:rPr lang="en" sz="1600">
+                <a:solidFill>
+                  <a:srgbClr val="666600"/>
+                </a:solidFill>
+                <a:latin typeface="Consolas"/>
+                <a:ea typeface="Consolas"/>
+                <a:cs typeface="Consolas"/>
+                <a:sym typeface="Consolas"/>
+              </a:rPr>
+              <a:t>=</a:t>
+            </a:r>
+            <a:r>
+              <a:rPr lang="en" sz="1600">
+                <a:solidFill>
+                  <a:schemeClr val="dk1"/>
+                </a:solidFill>
+                <a:latin typeface="Consolas"/>
+                <a:ea typeface="Consolas"/>
+                <a:cs typeface="Consolas"/>
+                <a:sym typeface="Consolas"/>
+              </a:rPr>
+              <a:t> findX</a:t>
+            </a:r>
+            <a:r>
+              <a:rPr lang="en" sz="1600">
+                <a:solidFill>
+                  <a:srgbClr val="666600"/>
+                </a:solidFill>
+                <a:latin typeface="Consolas"/>
+                <a:ea typeface="Consolas"/>
+                <a:cs typeface="Consolas"/>
+                <a:sym typeface="Consolas"/>
+              </a:rPr>
+              <a:t>(</a:t>
+            </a:r>
+            <a:r>
+              <a:rPr lang="en" sz="1600">
+                <a:solidFill>
+                  <a:schemeClr val="dk1"/>
+                </a:solidFill>
+                <a:latin typeface="Consolas"/>
+                <a:ea typeface="Consolas"/>
+                <a:cs typeface="Consolas"/>
+                <a:sym typeface="Consolas"/>
+              </a:rPr>
+              <a:t>A</a:t>
+            </a:r>
+            <a:r>
+              <a:rPr lang="en" sz="1600">
+                <a:solidFill>
+                  <a:srgbClr val="666600"/>
+                </a:solidFill>
+                <a:latin typeface="Consolas"/>
+                <a:ea typeface="Consolas"/>
+                <a:cs typeface="Consolas"/>
+                <a:sym typeface="Consolas"/>
+              </a:rPr>
+              <a:t>,</a:t>
+            </a:r>
+            <a:r>
+              <a:rPr lang="en" sz="1600">
+                <a:solidFill>
+                  <a:schemeClr val="dk1"/>
+                </a:solidFill>
+                <a:latin typeface="Consolas"/>
+                <a:ea typeface="Consolas"/>
+                <a:cs typeface="Consolas"/>
+                <a:sym typeface="Consolas"/>
+              </a:rPr>
+              <a:t> r</a:t>
+            </a:r>
+            <a:r>
+              <a:rPr lang="en" sz="1600">
+                <a:solidFill>
+                  <a:srgbClr val="666600"/>
+                </a:solidFill>
+                <a:latin typeface="Consolas"/>
+                <a:ea typeface="Consolas"/>
+                <a:cs typeface="Consolas"/>
+                <a:sym typeface="Consolas"/>
+              </a:rPr>
+              <a:t>,</a:t>
+            </a:r>
+            <a:r>
+              <a:rPr lang="en" sz="1600">
+                <a:solidFill>
+                  <a:schemeClr val="dk1"/>
+                </a:solidFill>
+                <a:latin typeface="Consolas"/>
+                <a:ea typeface="Consolas"/>
+                <a:cs typeface="Consolas"/>
+                <a:sym typeface="Consolas"/>
+              </a:rPr>
+              <a:t> rmed</a:t>
+            </a:r>
+            <a:r>
+              <a:rPr lang="en" sz="1600">
+                <a:solidFill>
+                  <a:srgbClr val="666600"/>
+                </a:solidFill>
+                <a:latin typeface="Consolas"/>
+                <a:ea typeface="Consolas"/>
+                <a:cs typeface="Consolas"/>
+                <a:sym typeface="Consolas"/>
+              </a:rPr>
+              <a:t>,</a:t>
+            </a:r>
+            <a:r>
+              <a:rPr lang="en" sz="1600">
+                <a:solidFill>
+                  <a:schemeClr val="dk1"/>
+                </a:solidFill>
+                <a:latin typeface="Consolas"/>
+                <a:ea typeface="Consolas"/>
+                <a:cs typeface="Consolas"/>
+                <a:sym typeface="Consolas"/>
+              </a:rPr>
+              <a:t> cmed</a:t>
+            </a:r>
+            <a:r>
+              <a:rPr lang="en" sz="1600">
+                <a:solidFill>
+                  <a:srgbClr val="666600"/>
+                </a:solidFill>
+                <a:latin typeface="Consolas"/>
+                <a:ea typeface="Consolas"/>
+                <a:cs typeface="Consolas"/>
+                <a:sym typeface="Consolas"/>
+              </a:rPr>
+              <a:t>+</a:t>
+            </a:r>
+            <a:r>
+              <a:rPr lang="en" sz="1600">
+                <a:solidFill>
+                  <a:srgbClr val="006666"/>
+                </a:solidFill>
+                <a:latin typeface="Consolas"/>
+                <a:ea typeface="Consolas"/>
+                <a:cs typeface="Consolas"/>
+                <a:sym typeface="Consolas"/>
+              </a:rPr>
+              <a:t>1</a:t>
+            </a:r>
+            <a:r>
+              <a:rPr lang="en" sz="1600">
+                <a:solidFill>
+                  <a:srgbClr val="666600"/>
+                </a:solidFill>
+                <a:latin typeface="Consolas"/>
+                <a:ea typeface="Consolas"/>
+                <a:cs typeface="Consolas"/>
+                <a:sym typeface="Consolas"/>
+              </a:rPr>
+              <a:t>,</a:t>
+            </a:r>
+            <a:r>
+              <a:rPr lang="en" sz="1600">
+                <a:solidFill>
+                  <a:schemeClr val="dk1"/>
+                </a:solidFill>
+                <a:latin typeface="Consolas"/>
+                <a:ea typeface="Consolas"/>
+                <a:cs typeface="Consolas"/>
+                <a:sym typeface="Consolas"/>
+              </a:rPr>
+              <a:t> clen</a:t>
+            </a:r>
+            <a:r>
+              <a:rPr lang="en" sz="1600">
+                <a:solidFill>
+                  <a:srgbClr val="666600"/>
+                </a:solidFill>
+                <a:latin typeface="Consolas"/>
+                <a:ea typeface="Consolas"/>
+                <a:cs typeface="Consolas"/>
+                <a:sym typeface="Consolas"/>
+              </a:rPr>
+              <a:t>-</a:t>
+            </a:r>
+            <a:r>
+              <a:rPr lang="en" sz="1600">
+                <a:solidFill>
+                  <a:schemeClr val="dk1"/>
+                </a:solidFill>
+                <a:latin typeface="Consolas"/>
+                <a:ea typeface="Consolas"/>
+                <a:cs typeface="Consolas"/>
+                <a:sym typeface="Consolas"/>
+              </a:rPr>
+              <a:t>cmed</a:t>
+            </a:r>
+            <a:r>
+              <a:rPr lang="en" sz="1600">
+                <a:solidFill>
+                  <a:srgbClr val="666600"/>
+                </a:solidFill>
+                <a:latin typeface="Consolas"/>
+                <a:ea typeface="Consolas"/>
+                <a:cs typeface="Consolas"/>
+                <a:sym typeface="Consolas"/>
+              </a:rPr>
+              <a:t>-</a:t>
+            </a:r>
+            <a:r>
+              <a:rPr lang="en" sz="1600">
+                <a:solidFill>
+                  <a:srgbClr val="006666"/>
+                </a:solidFill>
+                <a:latin typeface="Consolas"/>
+                <a:ea typeface="Consolas"/>
+                <a:cs typeface="Consolas"/>
+                <a:sym typeface="Consolas"/>
+              </a:rPr>
+              <a:t>1</a:t>
+            </a:r>
+            <a:r>
+              <a:rPr lang="en" sz="1600">
+                <a:solidFill>
+                  <a:srgbClr val="666600"/>
+                </a:solidFill>
+                <a:latin typeface="Consolas"/>
+                <a:ea typeface="Consolas"/>
+                <a:cs typeface="Consolas"/>
+                <a:sym typeface="Consolas"/>
+              </a:rPr>
+              <a:t>,</a:t>
+            </a:r>
+            <a:r>
+              <a:rPr lang="en" sz="1600">
+                <a:solidFill>
+                  <a:schemeClr val="dk1"/>
+                </a:solidFill>
+                <a:latin typeface="Consolas"/>
+                <a:ea typeface="Consolas"/>
+                <a:cs typeface="Consolas"/>
+                <a:sym typeface="Consolas"/>
+              </a:rPr>
+              <a:t> x)</a:t>
+            </a:r>
+          </a:p>
+          <a:p>
+            <a:pPr indent="-69850" lvl="0" marL="457200" rtl="0">
+              <a:spcBef>
+                <a:spcPts val="0"/>
+              </a:spcBef>
+              <a:spcAft>
+                <a:spcPts val="0"/>
+              </a:spcAft>
+              <a:buClr>
+                <a:schemeClr val="dk1"/>
+              </a:buClr>
+              <a:buSzPct val="68750"/>
+              <a:buFont typeface="Arial"/>
+              <a:buNone/>
+            </a:pPr>
+            <a:r>
+              <a:rPr lang="en" sz="1600">
+                <a:solidFill>
+                  <a:schemeClr val="dk1"/>
+                </a:solidFill>
+                <a:latin typeface="Consolas"/>
+                <a:ea typeface="Consolas"/>
+                <a:cs typeface="Consolas"/>
+                <a:sym typeface="Consolas"/>
+              </a:rPr>
+              <a:t>	</a:t>
+            </a:r>
+            <a:r>
+              <a:rPr i="1" lang="en" sz="1600">
+                <a:solidFill>
+                  <a:srgbClr val="000088"/>
+                </a:solidFill>
+                <a:latin typeface="Consolas"/>
+                <a:ea typeface="Consolas"/>
+                <a:cs typeface="Consolas"/>
+                <a:sym typeface="Consolas"/>
+              </a:rPr>
+              <a:t>return res if not equal -1</a:t>
+            </a:r>
+          </a:p>
+          <a:p>
+            <a:pPr indent="-69850" lvl="0" marL="457200">
+              <a:spcBef>
+                <a:spcPts val="0"/>
+              </a:spcBef>
+              <a:spcAft>
+                <a:spcPts val="0"/>
+              </a:spcAft>
+              <a:buClr>
+                <a:schemeClr val="dk1"/>
+              </a:buClr>
+              <a:buSzPct val="68750"/>
+              <a:buFont typeface="Arial"/>
+              <a:buNone/>
+            </a:pPr>
+            <a:r>
+              <a:rPr lang="en" sz="1600">
+                <a:solidFill>
+                  <a:schemeClr val="dk1"/>
+                </a:solidFill>
+                <a:latin typeface="Consolas"/>
+                <a:ea typeface="Consolas"/>
+                <a:cs typeface="Consolas"/>
+                <a:sym typeface="Consolas"/>
+              </a:rPr>
+              <a:t>	res </a:t>
+            </a:r>
+            <a:r>
+              <a:rPr lang="en" sz="1600">
+                <a:solidFill>
+                  <a:srgbClr val="666600"/>
+                </a:solidFill>
+                <a:latin typeface="Consolas"/>
+                <a:ea typeface="Consolas"/>
+                <a:cs typeface="Consolas"/>
+                <a:sym typeface="Consolas"/>
+              </a:rPr>
+              <a:t>=</a:t>
+            </a:r>
+            <a:r>
+              <a:rPr lang="en" sz="1600">
+                <a:solidFill>
+                  <a:schemeClr val="dk1"/>
+                </a:solidFill>
+                <a:latin typeface="Consolas"/>
+                <a:ea typeface="Consolas"/>
+                <a:cs typeface="Consolas"/>
+                <a:sym typeface="Consolas"/>
+              </a:rPr>
+              <a:t> findX</a:t>
+            </a:r>
+            <a:r>
+              <a:rPr lang="en" sz="1600">
+                <a:solidFill>
+                  <a:srgbClr val="666600"/>
+                </a:solidFill>
+                <a:latin typeface="Consolas"/>
+                <a:ea typeface="Consolas"/>
+                <a:cs typeface="Consolas"/>
+                <a:sym typeface="Consolas"/>
+              </a:rPr>
+              <a:t>(</a:t>
+            </a:r>
+            <a:r>
+              <a:rPr lang="en" sz="1600">
+                <a:solidFill>
+                  <a:schemeClr val="dk1"/>
+                </a:solidFill>
+                <a:latin typeface="Consolas"/>
+                <a:ea typeface="Consolas"/>
+                <a:cs typeface="Consolas"/>
+                <a:sym typeface="Consolas"/>
+              </a:rPr>
+              <a:t>A</a:t>
+            </a:r>
+            <a:r>
+              <a:rPr lang="en" sz="1600">
+                <a:solidFill>
+                  <a:srgbClr val="666600"/>
+                </a:solidFill>
+                <a:latin typeface="Consolas"/>
+                <a:ea typeface="Consolas"/>
+                <a:cs typeface="Consolas"/>
+                <a:sym typeface="Consolas"/>
+              </a:rPr>
+              <a:t>,</a:t>
+            </a:r>
+            <a:r>
+              <a:rPr lang="en" sz="1600">
+                <a:solidFill>
+                  <a:schemeClr val="dk1"/>
+                </a:solidFill>
+                <a:latin typeface="Consolas"/>
+                <a:ea typeface="Consolas"/>
+                <a:cs typeface="Consolas"/>
+                <a:sym typeface="Consolas"/>
+              </a:rPr>
+              <a:t> rmed</a:t>
+            </a:r>
+            <a:r>
+              <a:rPr lang="en" sz="1600">
+                <a:solidFill>
+                  <a:srgbClr val="666600"/>
+                </a:solidFill>
+                <a:latin typeface="Consolas"/>
+                <a:ea typeface="Consolas"/>
+                <a:cs typeface="Consolas"/>
+                <a:sym typeface="Consolas"/>
+              </a:rPr>
+              <a:t>,</a:t>
+            </a:r>
+            <a:r>
+              <a:rPr lang="en" sz="1600">
+                <a:solidFill>
+                  <a:schemeClr val="dk1"/>
+                </a:solidFill>
+                <a:latin typeface="Consolas"/>
+                <a:ea typeface="Consolas"/>
+                <a:cs typeface="Consolas"/>
+                <a:sym typeface="Consolas"/>
+              </a:rPr>
+              <a:t> rlen</a:t>
+            </a:r>
+            <a:r>
+              <a:rPr lang="en" sz="1600">
+                <a:solidFill>
+                  <a:srgbClr val="666600"/>
+                </a:solidFill>
+                <a:latin typeface="Consolas"/>
+                <a:ea typeface="Consolas"/>
+                <a:cs typeface="Consolas"/>
+                <a:sym typeface="Consolas"/>
+              </a:rPr>
+              <a:t>-</a:t>
+            </a:r>
+            <a:r>
+              <a:rPr lang="en" sz="1600">
+                <a:solidFill>
+                  <a:schemeClr val="dk1"/>
+                </a:solidFill>
+                <a:latin typeface="Consolas"/>
+                <a:ea typeface="Consolas"/>
+                <a:cs typeface="Consolas"/>
+                <a:sym typeface="Consolas"/>
+              </a:rPr>
+              <a:t>rmed</a:t>
+            </a:r>
+            <a:r>
+              <a:rPr lang="en" sz="1600">
+                <a:solidFill>
+                  <a:srgbClr val="666600"/>
+                </a:solidFill>
+                <a:latin typeface="Consolas"/>
+                <a:ea typeface="Consolas"/>
+                <a:cs typeface="Consolas"/>
+                <a:sym typeface="Consolas"/>
+              </a:rPr>
+              <a:t>,</a:t>
+            </a:r>
+            <a:r>
+              <a:rPr lang="en" sz="1600">
+                <a:solidFill>
+                  <a:schemeClr val="dk1"/>
+                </a:solidFill>
+                <a:latin typeface="Consolas"/>
+                <a:ea typeface="Consolas"/>
+                <a:cs typeface="Consolas"/>
+                <a:sym typeface="Consolas"/>
+              </a:rPr>
+              <a:t> c</a:t>
+            </a:r>
+            <a:r>
+              <a:rPr lang="en" sz="1600">
+                <a:solidFill>
+                  <a:srgbClr val="666600"/>
+                </a:solidFill>
+                <a:latin typeface="Consolas"/>
+                <a:ea typeface="Consolas"/>
+                <a:cs typeface="Consolas"/>
+                <a:sym typeface="Consolas"/>
+              </a:rPr>
+              <a:t>,</a:t>
+            </a:r>
+            <a:r>
+              <a:rPr lang="en" sz="1600">
+                <a:solidFill>
+                  <a:schemeClr val="dk1"/>
+                </a:solidFill>
+                <a:latin typeface="Consolas"/>
+                <a:ea typeface="Consolas"/>
+                <a:cs typeface="Consolas"/>
+                <a:sym typeface="Consolas"/>
+              </a:rPr>
+              <a:t> cmed</a:t>
+            </a:r>
+            <a:r>
+              <a:rPr lang="en" sz="1600">
+                <a:solidFill>
+                  <a:srgbClr val="666600"/>
+                </a:solidFill>
+                <a:latin typeface="Consolas"/>
+                <a:ea typeface="Consolas"/>
+                <a:cs typeface="Consolas"/>
+                <a:sym typeface="Consolas"/>
+              </a:rPr>
+              <a:t>,</a:t>
+            </a:r>
+            <a:r>
+              <a:rPr lang="en" sz="1600">
+                <a:solidFill>
+                  <a:schemeClr val="dk1"/>
+                </a:solidFill>
+                <a:latin typeface="Consolas"/>
+                <a:ea typeface="Consolas"/>
+                <a:cs typeface="Consolas"/>
+                <a:sym typeface="Consolas"/>
+              </a:rPr>
+              <a:t> x)</a:t>
+            </a:r>
+          </a:p>
+          <a:p>
+            <a:pPr indent="-69850" lvl="0" marL="457200" rtl="0">
+              <a:spcBef>
+                <a:spcPts val="0"/>
+              </a:spcBef>
+              <a:spcAft>
+                <a:spcPts val="0"/>
+              </a:spcAft>
+              <a:buClr>
+                <a:schemeClr val="dk1"/>
+              </a:buClr>
+              <a:buSzPct val="68750"/>
+              <a:buFont typeface="Arial"/>
+              <a:buNone/>
+            </a:pPr>
+            <a:r>
+              <a:rPr lang="en" sz="1600">
+                <a:solidFill>
+                  <a:schemeClr val="dk1"/>
+                </a:solidFill>
+                <a:latin typeface="Consolas"/>
+                <a:ea typeface="Consolas"/>
+                <a:cs typeface="Consolas"/>
+                <a:sym typeface="Consolas"/>
+              </a:rPr>
+              <a:t>	</a:t>
+            </a:r>
+            <a:r>
+              <a:rPr i="1" lang="en" sz="1600">
+                <a:solidFill>
+                  <a:srgbClr val="000088"/>
+                </a:solidFill>
+                <a:latin typeface="Consolas"/>
+                <a:ea typeface="Consolas"/>
+                <a:cs typeface="Consolas"/>
+                <a:sym typeface="Consolas"/>
+              </a:rPr>
+              <a:t>return res if not equal -1</a:t>
+            </a:r>
+          </a:p>
+          <a:p>
+            <a:pPr lvl="0">
+              <a:spcBef>
+                <a:spcPts val="0"/>
+              </a:spcBef>
+              <a:buNone/>
+            </a:pPr>
+            <a:r>
+              <a:t/>
+            </a:r>
+            <a:endParaRPr/>
           </a:p>
         </p:txBody>
       </p:sp>
@@ -5676,7 +6844,7 @@
           </a:bodyPr>
           <a:lstStyle/>
           <a:p>
-            <a:pPr lvl="0">
+            <a:pPr lvl="0" rtl="0">
               <a:spcBef>
                 <a:spcPts val="0"/>
               </a:spcBef>
@@ -5684,20 +6852,8 @@
             </a:pPr>
             <a:r>
               <a:rPr lang="en"/>
-              <a:t>Procedure</a:t>
-            </a:r>
-          </a:p>
-          <a:p>
-            <a:pPr lvl="0">
-              <a:spcBef>
-                <a:spcPts val="0"/>
-              </a:spcBef>
-              <a:buNone/>
-            </a:pPr>
-            <a:r>
-              <a:t/>
-            </a:r>
-            <a:endParaRPr/>
+              <a:t>Time Complexity</a:t>
+            </a:r>
           </a:p>
         </p:txBody>
       </p:sp>
@@ -5724,76 +6880,128 @@
           </a:bodyPr>
           <a:lstStyle/>
           <a:p>
-            <a:pPr indent="-228600" lvl="0" marL="457200" rtl="0">
-              <a:spcBef>
-                <a:spcPts val="0"/>
-              </a:spcBef>
-              <a:buAutoNum type="arabicParenR"/>
+            <a:pPr lvl="0" rtl="0">
+              <a:spcBef>
+                <a:spcPts val="0"/>
+              </a:spcBef>
+              <a:buNone/>
             </a:pPr>
             <a:r>
               <a:rPr lang="en"/>
-              <a:t>Pick out a group of words</a:t>
-            </a:r>
-          </a:p>
-          <a:p>
-            <a:pPr indent="-228600" lvl="0" marL="457200" rtl="0">
-              <a:spcBef>
-                <a:spcPts val="0"/>
-              </a:spcBef>
-              <a:buAutoNum type="arabicParenR"/>
+              <a:t>T(N) = 3 T(N / 4) + 1</a:t>
+            </a:r>
+          </a:p>
+          <a:p>
+            <a:pPr lvl="0">
+              <a:spcBef>
+                <a:spcPts val="0"/>
+              </a:spcBef>
+              <a:buNone/>
             </a:pPr>
             <a:r>
               <a:rPr lang="en"/>
-              <a:t>Create a phrase to search</a:t>
-            </a:r>
-          </a:p>
-          <a:p>
-            <a:pPr indent="-228600" lvl="0" marL="457200" rtl="0">
-              <a:spcBef>
-                <a:spcPts val="0"/>
-              </a:spcBef>
-              <a:buAutoNum type="arabicParenR"/>
+              <a:t>Master Theorem:</a:t>
+            </a:r>
+          </a:p>
+          <a:p>
+            <a:pPr lvl="0">
+              <a:spcBef>
+                <a:spcPts val="0"/>
+              </a:spcBef>
+              <a:buNone/>
             </a:pPr>
             <a:r>
               <a:rPr lang="en"/>
-              <a:t>One person puts in the search and passes top result to evaluator</a:t>
-            </a:r>
-          </a:p>
-          <a:p>
-            <a:pPr indent="-228600" lvl="0" marL="457200" rtl="0">
-              <a:spcBef>
-                <a:spcPts val="0"/>
-              </a:spcBef>
-              <a:buAutoNum type="arabicParenR"/>
+              <a:t>AT(N/B) +f(N)				A=3, B =4, f(N) = O(1)</a:t>
+            </a:r>
+          </a:p>
+          <a:p>
+            <a:pPr lvl="0">
+              <a:spcBef>
+                <a:spcPts val="0"/>
+              </a:spcBef>
+              <a:buNone/>
             </a:pPr>
             <a:r>
               <a:rPr lang="en"/>
-              <a:t>Evaluator compares respective search result ranking sites</a:t>
-            </a:r>
-          </a:p>
-          <a:p>
-            <a:pPr indent="-228600" lvl="0" marL="457200" rtl="0">
-              <a:spcBef>
-                <a:spcPts val="0"/>
-              </a:spcBef>
-              <a:buAutoNum type="arabicParenR"/>
-            </a:pPr>
+              <a:t> Since f(N) &lt; O(n^log</a:t>
+            </a:r>
+            <a:r>
+              <a:rPr baseline="-25000" lang="en"/>
+              <a:t>B</a:t>
+            </a:r>
             <a:r>
               <a:rPr lang="en"/>
-              <a:t>Evaluator awards points on certain categories</a:t>
-            </a:r>
-          </a:p>
-          <a:p>
-            <a:pPr indent="-228600" lvl="0" marL="457200">
-              <a:spcBef>
-                <a:spcPts val="0"/>
-              </a:spcBef>
-              <a:buAutoNum type="arabicParenR"/>
-            </a:pPr>
+              <a:t>A)		O(1) &lt; O(n</a:t>
+            </a:r>
             <a:r>
               <a:rPr lang="en"/>
-              <a:t>Add points and whichever has most points is the best</a:t>
-            </a:r>
+              <a:t>^</a:t>
+            </a:r>
+            <a:r>
+              <a:rPr lang="en"/>
+              <a:t>log</a:t>
+            </a:r>
+            <a:r>
+              <a:rPr baseline="-25000" lang="en"/>
+              <a:t>4</a:t>
+            </a:r>
+            <a:r>
+              <a:rPr lang="en"/>
+              <a:t>3)</a:t>
+            </a:r>
+          </a:p>
+          <a:p>
+            <a:pPr lvl="0" rtl="0">
+              <a:spcBef>
+                <a:spcPts val="0"/>
+              </a:spcBef>
+              <a:buNone/>
+            </a:pPr>
+            <a:r>
+              <a:rPr lang="en"/>
+              <a:t>Time Complexity = O(n^log</a:t>
+            </a:r>
+            <a:r>
+              <a:rPr baseline="-25000" lang="en"/>
+              <a:t>B</a:t>
+            </a:r>
+            <a:r>
+              <a:rPr lang="en"/>
+              <a:t>A)</a:t>
+            </a:r>
+          </a:p>
+          <a:p>
+            <a:pPr lvl="0" rtl="0">
+              <a:spcBef>
+                <a:spcPts val="0"/>
+              </a:spcBef>
+              <a:buNone/>
+            </a:pPr>
+            <a:r>
+              <a:rPr lang="en"/>
+              <a:t>Time Complexity: O(n^log</a:t>
+            </a:r>
+            <a:r>
+              <a:rPr baseline="-25000" lang="en"/>
+              <a:t>4</a:t>
+            </a:r>
+            <a:r>
+              <a:rPr lang="en"/>
+              <a:t>3)</a:t>
+            </a:r>
+          </a:p>
+          <a:p>
+            <a:pPr lvl="0" rtl="0">
+              <a:spcBef>
+                <a:spcPts val="0"/>
+              </a:spcBef>
+              <a:buNone/>
+            </a:pPr>
+            <a:r>
+              <a:t/>
+            </a:r>
+            <a:endParaRPr/>
           </a:p>
         </p:txBody>
       </p:sp>
@@ -5832,6 +7040,67 @@
         </p:nvSpPr>
         <p:spPr>
           <a:xfrm>
+            <a:off x="512700" y="1893300"/>
+            <a:ext cx="8118600" cy="1522800"/>
+          </a:xfrm>
+          <a:prstGeom prst="rect">
+            <a:avLst/>
+          </a:prstGeom>
+        </p:spPr>
+        <p:txBody>
+          <a:bodyPr anchorCtr="0" anchor="b" bIns="91425" lIns="91425" rIns="91425" tIns="91425">
+            <a:noAutofit/>
+          </a:bodyPr>
+          <a:lstStyle/>
+          <a:p>
+            <a:pPr lvl="0">
+              <a:spcBef>
+                <a:spcPts val="0"/>
+              </a:spcBef>
+              <a:buNone/>
+            </a:pPr>
+            <a:r>
+              <a:rPr lang="en"/>
+              <a:t>Search Engine Evaluation</a:t>
+            </a:r>
+          </a:p>
+        </p:txBody>
+      </p:sp>
+    </p:spTree>
+  </p:cSld>
+  <p:clrMapOvr>
+    <a:masterClrMapping/>
+  </p:clrMapOvr>
+</p:sld>
+</file>
+
+<file path=ppt/slides/slide13.xml><?xml version="1.0" encoding="utf-8"?>
+<p:sld xmlns:a="http://schemas.openxmlformats.org/drawingml/2006/main" xmlns:r="http://schemas.openxmlformats.org/officeDocument/2006/relationships" xmlns:mc="http://schemas.openxmlformats.org/markup-compatibility/2006" xmlns:mv="urn:schemas-microsoft-com:mac:vml" xmlns:p="http://schemas.openxmlformats.org/presentationml/2006/main" xmlns:c="http://schemas.openxmlformats.org/drawingml/2006/chart" xmlns:dgm="http://schemas.openxmlformats.org/drawingml/2006/diagram" xmlns:o="urn:schemas-microsoft-com:office:office" xmlns:v="urn:schemas-microsoft-com:vml" xmlns:pvml="urn:schemas-microsoft-com:office:powerpoint" xmlns:com="http://schemas.openxmlformats.org/drawingml/2006/compatibility" xmlns:p14="http://schemas.microsoft.com/office/powerpoint/2010/main">
+  <p:cSld>
+    <p:spTree>
+      <p:nvGrpSpPr>
+        <p:cNvPr id="128" name="Shape 128"/>
+        <p:cNvGrpSpPr/>
+        <p:nvPr/>
+      </p:nvGrpSpPr>
+      <p:grpSpPr>
+        <a:xfrm>
+          <a:off x="0" y="0"/>
+          <a:ext cx="0" cy="0"/>
+          <a:chOff x="0" y="0"/>
+          <a:chExt cx="0" cy="0"/>
+        </a:xfrm>
+      </p:grpSpPr>
+      <p:sp>
+        <p:nvSpPr>
+          <p:cNvPr id="129" name="Shape 129"/>
+          <p:cNvSpPr txBox="1"/>
+          <p:nvPr>
+            <p:ph type="title"/>
+          </p:nvPr>
+        </p:nvSpPr>
+        <p:spPr>
+          <a:xfrm>
             <a:off x="311700" y="445025"/>
             <a:ext cx="8520600" cy="613200"/>
           </a:xfrm>
@@ -5853,14 +7122,26 @@
             </a:pPr>
             <a:r>
               <a:rPr lang="en"/>
-              <a:t>Categories </a:t>
-            </a:r>
+              <a:t>Procedure</a:t>
+            </a:r>
+          </a:p>
+          <a:p>
+            <a:pPr lvl="0">
+              <a:spcBef>
+                <a:spcPts val="0"/>
+              </a:spcBef>
+              <a:buNone/>
+            </a:pPr>
+            <a:r>
+              <a:t/>
+            </a:r>
+            <a:endParaRPr/>
           </a:p>
         </p:txBody>
       </p:sp>
       <p:sp>
         <p:nvSpPr>
-          <p:cNvPr id="125" name="Shape 125"/>
+          <p:cNvPr id="130" name="Shape 130"/>
           <p:cNvSpPr txBox="1"/>
           <p:nvPr>
             <p:ph idx="1" type="body"/>
@@ -5881,27 +7162,27 @@
           </a:bodyPr>
           <a:lstStyle/>
           <a:p>
-            <a:pPr lvl="0">
-              <a:spcBef>
-                <a:spcPts val="0"/>
-              </a:spcBef>
-              <a:buNone/>
+            <a:pPr indent="-228600" lvl="0" marL="457200" rtl="0">
+              <a:spcBef>
+                <a:spcPts val="0"/>
+              </a:spcBef>
+              <a:buAutoNum type="arabicParenR"/>
             </a:pPr>
             <a:r>
               <a:rPr lang="en"/>
-              <a:t>Using similarweb.com statistics about each site was obtained to test Google, DuckDuckGo, and Dogpile</a:t>
-            </a:r>
-          </a:p>
-          <a:p>
-            <a:pPr lvl="0">
-              <a:spcBef>
-                <a:spcPts val="0"/>
-              </a:spcBef>
-              <a:buNone/>
+              <a:t>Pick out a group of words</a:t>
+            </a:r>
+          </a:p>
+          <a:p>
+            <a:pPr indent="-228600" lvl="0" marL="457200" rtl="0">
+              <a:spcBef>
+                <a:spcPts val="0"/>
+              </a:spcBef>
+              <a:buAutoNum type="arabicParenR"/>
             </a:pPr>
             <a:r>
               <a:rPr lang="en"/>
-              <a:t>Categories Tested:</a:t>
+              <a:t>Create a phrase to search</a:t>
             </a:r>
           </a:p>
           <a:p>
@@ -5909,10 +7190,11 @@
               <a:spcBef>
                 <a:spcPts val="0"/>
               </a:spcBef>
+              <a:buAutoNum type="arabicParenR"/>
             </a:pPr>
             <a:r>
               <a:rPr lang="en"/>
-              <a:t>Total Visits (10 pts)</a:t>
+              <a:t>One person puts in the search and passes top result to evaluator</a:t>
             </a:r>
           </a:p>
           <a:p>
@@ -5920,10 +7202,11 @@
               <a:spcBef>
                 <a:spcPts val="0"/>
               </a:spcBef>
+              <a:buAutoNum type="arabicParenR"/>
             </a:pPr>
             <a:r>
               <a:rPr lang="en"/>
-              <a:t>Traffic from Search (10 pts)</a:t>
+              <a:t>Evaluator compares respective search result ranking sites</a:t>
             </a:r>
           </a:p>
           <a:p>
@@ -5931,34 +7214,24 @@
               <a:spcBef>
                 <a:spcPts val="0"/>
               </a:spcBef>
+              <a:buAutoNum type="arabicParenR"/>
             </a:pPr>
             <a:r>
               <a:rPr lang="en"/>
-              <a:t>String Matches  (10 pts)</a:t>
-            </a:r>
-          </a:p>
-          <a:p>
-            <a:pPr indent="-228600" lvl="1" marL="1371600" rtl="0">
-              <a:spcBef>
-                <a:spcPts val="0"/>
-              </a:spcBef>
+              <a:t>Evaluator awards points on certain categories</a:t>
+            </a:r>
+          </a:p>
+          <a:p>
+            <a:pPr indent="-228600" lvl="0" marL="457200">
+              <a:spcBef>
+                <a:spcPts val="0"/>
+              </a:spcBef>
+              <a:buAutoNum type="arabicParenR"/>
             </a:pPr>
             <a:r>
               <a:rPr lang="en"/>
-              <a:t>Full points for finding all words, partial points for single words</a:t>
-            </a:r>
-          </a:p>
-          <a:p>
-            <a:pPr lvl="0">
-              <a:spcBef>
-                <a:spcPts val="0"/>
-              </a:spcBef>
-              <a:buNone/>
-            </a:pPr>
-            <a:r>
-              <a:t/>
-            </a:r>
-            <a:endParaRPr/>
+              <a:t>Add points and whichever has most points is the best</a:t>
+            </a:r>
           </a:p>
         </p:txBody>
       </p:sp>
@@ -5970,12 +7243,12 @@
 </p:sld>
 </file>
 
-<file path=ppt/slides/slide13.xml><?xml version="1.0" encoding="utf-8"?>
+<file path=ppt/slides/slide14.xml><?xml version="1.0" encoding="utf-8"?>
 <p:sld xmlns:a="http://schemas.openxmlformats.org/drawingml/2006/main" xmlns:r="http://schemas.openxmlformats.org/officeDocument/2006/relationships" xmlns:mc="http://schemas.openxmlformats.org/markup-compatibility/2006" xmlns:mv="urn:schemas-microsoft-com:mac:vml" xmlns:p="http://schemas.openxmlformats.org/presentationml/2006/main" xmlns:c="http://schemas.openxmlformats.org/drawingml/2006/chart" xmlns:dgm="http://schemas.openxmlformats.org/drawingml/2006/diagram" xmlns:o="urn:schemas-microsoft-com:office:office" xmlns:v="urn:schemas-microsoft-com:vml" xmlns:pvml="urn:schemas-microsoft-com:office:powerpoint" xmlns:com="http://schemas.openxmlformats.org/drawingml/2006/compatibility" xmlns:p14="http://schemas.microsoft.com/office/powerpoint/2010/main">
   <p:cSld>
     <p:spTree>
       <p:nvGrpSpPr>
-        <p:cNvPr id="129" name="Shape 129"/>
+        <p:cNvPr id="134" name="Shape 134"/>
         <p:cNvGrpSpPr/>
         <p:nvPr/>
       </p:nvGrpSpPr>
@@ -5989,7 +7262,7 @@
       </p:grpSpPr>
       <p:sp>
         <p:nvSpPr>
-          <p:cNvPr id="130" name="Shape 130"/>
+          <p:cNvPr id="135" name="Shape 135"/>
           <p:cNvSpPr txBox="1"/>
           <p:nvPr>
             <p:ph type="title"/>
@@ -6018,14 +7291,14 @@
             </a:pPr>
             <a:r>
               <a:rPr lang="en"/>
-              <a:t>Results</a:t>
+              <a:t>Categories </a:t>
             </a:r>
           </a:p>
         </p:txBody>
       </p:sp>
       <p:sp>
         <p:nvSpPr>
-          <p:cNvPr id="131" name="Shape 131"/>
+          <p:cNvPr id="136" name="Shape 136"/>
           <p:cNvSpPr txBox="1"/>
           <p:nvPr>
             <p:ph idx="1" type="body"/>
@@ -6046,6 +7319,171 @@
           </a:bodyPr>
           <a:lstStyle/>
           <a:p>
+            <a:pPr lvl="0">
+              <a:spcBef>
+                <a:spcPts val="0"/>
+              </a:spcBef>
+              <a:buNone/>
+            </a:pPr>
+            <a:r>
+              <a:rPr lang="en"/>
+              <a:t>Using similarweb.com statistics about each site was obtained to test Google, DuckDuckGo, and Dogpile</a:t>
+            </a:r>
+          </a:p>
+          <a:p>
+            <a:pPr lvl="0">
+              <a:spcBef>
+                <a:spcPts val="0"/>
+              </a:spcBef>
+              <a:buNone/>
+            </a:pPr>
+            <a:r>
+              <a:rPr lang="en"/>
+              <a:t>Categories Tested:</a:t>
+            </a:r>
+          </a:p>
+          <a:p>
+            <a:pPr indent="-228600" lvl="0" marL="457200" rtl="0">
+              <a:spcBef>
+                <a:spcPts val="0"/>
+              </a:spcBef>
+            </a:pPr>
+            <a:r>
+              <a:rPr lang="en"/>
+              <a:t>Total Visits (10 pts)</a:t>
+            </a:r>
+          </a:p>
+          <a:p>
+            <a:pPr indent="-228600" lvl="0" marL="457200" rtl="0">
+              <a:spcBef>
+                <a:spcPts val="0"/>
+              </a:spcBef>
+            </a:pPr>
+            <a:r>
+              <a:rPr lang="en"/>
+              <a:t>Traffic from Search (10 pts)</a:t>
+            </a:r>
+          </a:p>
+          <a:p>
+            <a:pPr indent="-228600" lvl="0" marL="457200" rtl="0">
+              <a:spcBef>
+                <a:spcPts val="0"/>
+              </a:spcBef>
+            </a:pPr>
+            <a:r>
+              <a:rPr lang="en"/>
+              <a:t>String Matches  (10 pts)</a:t>
+            </a:r>
+          </a:p>
+          <a:p>
+            <a:pPr indent="-228600" lvl="1" marL="1371600" rtl="0">
+              <a:spcBef>
+                <a:spcPts val="0"/>
+              </a:spcBef>
+            </a:pPr>
+            <a:r>
+              <a:rPr lang="en"/>
+              <a:t>Full points for finding all words, partial points for single words</a:t>
+            </a:r>
+          </a:p>
+          <a:p>
+            <a:pPr lvl="0">
+              <a:spcBef>
+                <a:spcPts val="0"/>
+              </a:spcBef>
+              <a:buNone/>
+            </a:pPr>
+            <a:r>
+              <a:t/>
+            </a:r>
+            <a:endParaRPr/>
+          </a:p>
+        </p:txBody>
+      </p:sp>
+    </p:spTree>
+  </p:cSld>
+  <p:clrMapOvr>
+    <a:masterClrMapping/>
+  </p:clrMapOvr>
+</p:sld>
+</file>
+
+<file path=ppt/slides/slide15.xml><?xml version="1.0" encoding="utf-8"?>
+<p:sld xmlns:a="http://schemas.openxmlformats.org/drawingml/2006/main" xmlns:r="http://schemas.openxmlformats.org/officeDocument/2006/relationships" xmlns:mc="http://schemas.openxmlformats.org/markup-compatibility/2006" xmlns:mv="urn:schemas-microsoft-com:mac:vml" xmlns:p="http://schemas.openxmlformats.org/presentationml/2006/main" xmlns:c="http://schemas.openxmlformats.org/drawingml/2006/chart" xmlns:dgm="http://schemas.openxmlformats.org/drawingml/2006/diagram" xmlns:o="urn:schemas-microsoft-com:office:office" xmlns:v="urn:schemas-microsoft-com:vml" xmlns:pvml="urn:schemas-microsoft-com:office:powerpoint" xmlns:com="http://schemas.openxmlformats.org/drawingml/2006/compatibility" xmlns:p14="http://schemas.microsoft.com/office/powerpoint/2010/main">
+  <p:cSld>
+    <p:spTree>
+      <p:nvGrpSpPr>
+        <p:cNvPr id="140" name="Shape 140"/>
+        <p:cNvGrpSpPr/>
+        <p:nvPr/>
+      </p:nvGrpSpPr>
+      <p:grpSpPr>
+        <a:xfrm>
+          <a:off x="0" y="0"/>
+          <a:ext cx="0" cy="0"/>
+          <a:chOff x="0" y="0"/>
+          <a:chExt cx="0" cy="0"/>
+        </a:xfrm>
+      </p:grpSpPr>
+      <p:sp>
+        <p:nvSpPr>
+          <p:cNvPr id="141" name="Shape 141"/>
+          <p:cNvSpPr txBox="1"/>
+          <p:nvPr>
+            <p:ph type="title"/>
+          </p:nvPr>
+        </p:nvSpPr>
+        <p:spPr>
+          <a:xfrm>
+            <a:off x="311700" y="445025"/>
+            <a:ext cx="8520600" cy="613200"/>
+          </a:xfrm>
+          <a:prstGeom prst="rect">
+            <a:avLst/>
+          </a:prstGeom>
+        </p:spPr>
+        <p:txBody>
+          <a:bodyPr anchorCtr="0" anchor="t" bIns="91425" lIns="91425" rIns="91425" tIns="91425">
+            <a:noAutofit/>
+          </a:bodyPr>
+          <a:lstStyle/>
+          <a:p>
+            <a:pPr lvl="0">
+              <a:spcBef>
+                <a:spcPts val="0"/>
+              </a:spcBef>
+              <a:buNone/>
+            </a:pPr>
+            <a:r>
+              <a:rPr lang="en"/>
+              <a:t>Results</a:t>
+            </a:r>
+          </a:p>
+        </p:txBody>
+      </p:sp>
+      <p:sp>
+        <p:nvSpPr>
+          <p:cNvPr id="142" name="Shape 142"/>
+          <p:cNvSpPr txBox="1"/>
+          <p:nvPr>
+            <p:ph idx="1" type="body"/>
+          </p:nvPr>
+        </p:nvSpPr>
+        <p:spPr>
+          <a:xfrm>
+            <a:off x="311700" y="1171600"/>
+            <a:ext cx="8520600" cy="3397200"/>
+          </a:xfrm>
+          <a:prstGeom prst="rect">
+            <a:avLst/>
+          </a:prstGeom>
+        </p:spPr>
+        <p:txBody>
+          <a:bodyPr anchorCtr="0" anchor="t" bIns="91425" lIns="91425" rIns="91425" tIns="91425">
+            <a:noAutofit/>
+          </a:bodyPr>
+          <a:lstStyle/>
+          <a:p>
             <a:pPr lvl="0" rtl="0">
               <a:spcBef>
                 <a:spcPts val="0"/>
@@ -6061,7 +7499,7 @@
       </p:sp>
       <p:graphicFrame>
         <p:nvGraphicFramePr>
-          <p:cNvPr id="132" name="Shape 132"/>
+          <p:cNvPr id="143" name="Shape 143"/>
           <p:cNvGraphicFramePr/>
           <p:nvPr/>
         </p:nvGraphicFramePr>
@@ -6074,7 +7512,7 @@
             <a:tbl>
               <a:tblPr>
                 <a:noFill/>
-                <a:tableStyleId>{483B52FB-DB45-4FF0-89F1-B268A706C296}</a:tableStyleId>
+                <a:tableStyleId>{64579DC9-B1AD-4EEA-9DD0-C4BEC07ACDBA}</a:tableStyleId>
               </a:tblPr>
               <a:tblGrid>
                 <a:gridCol w="3619500"/>
@@ -6377,7 +7815,7 @@
             </a:pPr>
             <a:r>
               <a:rPr lang="en"/>
-              <a:t>Correctness Proof of Huffman Encoding Algorithm</a:t>
+              <a:t>Huffman Encoding Algorithm</a:t>
             </a:r>
           </a:p>
         </p:txBody>
@@ -6392,8 +7830,8 @@
         </p:nvSpPr>
         <p:spPr>
           <a:xfrm>
-            <a:off x="311700" y="1386125"/>
-            <a:ext cx="4217400" cy="3397200"/>
+            <a:off x="311700" y="1171600"/>
+            <a:ext cx="8520600" cy="3397200"/>
           </a:xfrm>
           <a:prstGeom prst="rect">
             <a:avLst/>
@@ -6405,69 +7843,103 @@
           </a:bodyPr>
           <a:lstStyle/>
           <a:p>
-            <a:pPr indent="-228600" lvl="0" marL="457200" rtl="0">
-              <a:spcBef>
-                <a:spcPts val="0"/>
-              </a:spcBef>
-            </a:pPr>
-            <a:r>
-              <a:rPr lang="en"/>
-              <a:t>To justify the correctness, we will be doing a proof by contradiction</a:t>
-            </a:r>
-          </a:p>
-          <a:p>
-            <a:pPr indent="-228600" lvl="0" marL="457200" rtl="0">
-              <a:spcBef>
-                <a:spcPts val="0"/>
-              </a:spcBef>
-            </a:pPr>
-            <a:r>
-              <a:rPr lang="en"/>
-              <a:t>We will be assuming that for two symbols A and B with probabilities p(A) &gt;= p(B), then it is possible for the length of symbol A to be longer than that of symbol B.</a:t>
-            </a:r>
-          </a:p>
-          <a:p>
-            <a:pPr lvl="0">
-              <a:spcBef>
-                <a:spcPts val="0"/>
-              </a:spcBef>
-              <a:buNone/>
-            </a:pPr>
-            <a:r>
-              <a:t/>
-            </a:r>
-            <a:endParaRPr sz="1200"/>
+            <a:pPr indent="-317500" lvl="0" marL="457200" rtl="0">
+              <a:spcBef>
+                <a:spcPts val="0"/>
+              </a:spcBef>
+              <a:buSzPct val="100000"/>
+            </a:pPr>
+            <a:r>
+              <a:rPr lang="en" sz="1400"/>
+              <a:t>The Huffman Encoding is an algorithm used for lossless data compression.</a:t>
+            </a:r>
+          </a:p>
+          <a:p>
+            <a:pPr indent="-317500" lvl="0" marL="457200" rtl="0">
+              <a:spcBef>
+                <a:spcPts val="0"/>
+              </a:spcBef>
+              <a:buSzPct val="100000"/>
+            </a:pPr>
+            <a:r>
+              <a:rPr lang="en" sz="1400"/>
+              <a:t>The idea behind this is that the letters/symbols in the data that we are trying to compress appears at different frequencies.</a:t>
+            </a:r>
+          </a:p>
+          <a:p>
+            <a:pPr indent="-317500" lvl="0" marL="457200" rtl="0">
+              <a:spcBef>
+                <a:spcPts val="0"/>
+              </a:spcBef>
+              <a:buSzPct val="100000"/>
+            </a:pPr>
+            <a:r>
+              <a:rPr lang="en" sz="1400"/>
+              <a:t>For example the phrase “Pen Pineapple Apple Pen” has 7 P, 5 E, 3 N, 1 I, 3 A, and 1 L.</a:t>
+            </a:r>
+          </a:p>
+          <a:p>
+            <a:pPr indent="-317500" lvl="0" marL="457200" rtl="0">
+              <a:spcBef>
+                <a:spcPts val="0"/>
+              </a:spcBef>
+              <a:buSzPct val="100000"/>
+            </a:pPr>
+            <a:r>
+              <a:rPr lang="en" sz="1400"/>
+              <a:t>Each letter is represented as a node and the two nodes with the lowest occurrences/frequencies is paired under one parent node with a frequency value equal to the total of the two child nodes. </a:t>
+            </a:r>
+          </a:p>
+          <a:p>
+            <a:pPr indent="-317500" lvl="0" marL="457200" rtl="0">
+              <a:spcBef>
+                <a:spcPts val="0"/>
+              </a:spcBef>
+              <a:buSzPct val="100000"/>
+            </a:pPr>
+            <a:r>
+              <a:rPr lang="en" sz="1400"/>
+              <a:t>We continue to pair the two lowest frequency nodes together until all nodes are under one root node</a:t>
+            </a:r>
+          </a:p>
+          <a:p>
+            <a:pPr indent="-317500" lvl="0" marL="457200" rtl="0">
+              <a:spcBef>
+                <a:spcPts val="0"/>
+              </a:spcBef>
+              <a:buSzPct val="100000"/>
+            </a:pPr>
+            <a:r>
+              <a:rPr lang="en" sz="1400"/>
+              <a:t>Afterward the binary code to encode each symbol can be derived by traversing the tree that was created</a:t>
+            </a:r>
+          </a:p>
+          <a:p>
+            <a:pPr indent="-317500" lvl="0" marL="457200" rtl="0">
+              <a:spcBef>
+                <a:spcPts val="0"/>
+              </a:spcBef>
+              <a:buSzPct val="100000"/>
+            </a:pPr>
+            <a:r>
+              <a:rPr lang="en" sz="1400"/>
+              <a:t>As we traverse down, if we were traverse down a left branch we would include a 0 in the code, and a right traverse would be a 1.</a:t>
+            </a:r>
+          </a:p>
+          <a:p>
+            <a:pPr indent="-317500" lvl="0" marL="457200">
+              <a:spcBef>
+                <a:spcPts val="0"/>
+              </a:spcBef>
+              <a:buSzPct val="100000"/>
+            </a:pPr>
+            <a:r>
+              <a:rPr lang="en" sz="1400"/>
+              <a:t>The full code is given once we reached the symbol we want to encode.</a:t>
+            </a:r>
           </a:p>
         </p:txBody>
       </p:sp>
-      <p:pic>
-        <p:nvPicPr>
-          <p:cNvPr id="72" name="Shape 72"/>
-          <p:cNvPicPr preferRelativeResize="0"/>
-          <p:nvPr/>
-        </p:nvPicPr>
-        <p:blipFill>
-          <a:blip r:embed="rId3">
-            <a:alphaModFix/>
-          </a:blip>
-          <a:stretch>
-            <a:fillRect/>
-          </a:stretch>
-        </p:blipFill>
-        <p:spPr>
-          <a:xfrm>
-            <a:off x="4725399" y="1514174"/>
-            <a:ext cx="4061575" cy="2890850"/>
-          </a:xfrm>
-          <a:prstGeom prst="rect">
-            <a:avLst/>
-          </a:prstGeom>
-          <a:noFill/>
-          <a:ln>
-            <a:noFill/>
-          </a:ln>
-        </p:spPr>
-      </p:pic>
     </p:spTree>
   </p:cSld>
   <p:clrMapOvr>
@@ -6481,7 +7953,7 @@
   <p:cSld>
     <p:spTree>
       <p:nvGrpSpPr>
-        <p:cNvPr id="76" name="Shape 76"/>
+        <p:cNvPr id="75" name="Shape 75"/>
         <p:cNvGrpSpPr/>
         <p:nvPr/>
       </p:nvGrpSpPr>
@@ -6495,7 +7967,7 @@
       </p:grpSpPr>
       <p:sp>
         <p:nvSpPr>
-          <p:cNvPr id="77" name="Shape 77"/>
+          <p:cNvPr id="76" name="Shape 76"/>
           <p:cNvSpPr txBox="1"/>
           <p:nvPr>
             <p:ph type="title"/>
@@ -6524,14 +7996,14 @@
             </a:pPr>
             <a:r>
               <a:rPr lang="en"/>
-              <a:t>Huffman Encoding Cont.</a:t>
+              <a:t>Huffman Encoding Induction Proof	</a:t>
             </a:r>
           </a:p>
         </p:txBody>
       </p:sp>
       <p:sp>
         <p:nvSpPr>
-          <p:cNvPr id="78" name="Shape 78"/>
+          <p:cNvPr id="77" name="Shape 77"/>
           <p:cNvSpPr txBox="1"/>
           <p:nvPr>
             <p:ph idx="1" type="body"/>
@@ -6552,28 +8024,143 @@
           </a:bodyPr>
           <a:lstStyle/>
           <a:p>
-            <a:pPr indent="-381000" lvl="0" marL="457200">
-              <a:spcBef>
-                <a:spcPts val="0"/>
-              </a:spcBef>
-              <a:buSzPct val="100000"/>
-            </a:pPr>
-            <a:r>
-              <a:rPr lang="en" sz="2400"/>
-              <a:t>Under our assumption, then in our tree representation of the symbols, the node for symbol A would have a larger depth than that of symbol B </a:t>
-            </a:r>
-          </a:p>
-          <a:p>
-            <a:pPr indent="-381000" lvl="0" marL="457200">
-              <a:spcBef>
-                <a:spcPts val="0"/>
-              </a:spcBef>
-              <a:buSzPct val="100000"/>
-            </a:pPr>
-            <a:r>
-              <a:rPr lang="en" sz="2400"/>
-              <a:t>Since the node for symbol B has a smaller depth then its frequency or probability would have to be higher than that of symbol A or equal to symbol A, which contradicts the statement that p(A) &gt;= p(B).</a:t>
-            </a:r>
+            <a:pPr indent="0" lvl="0" marL="0" rtl="0">
+              <a:spcBef>
+                <a:spcPts val="0"/>
+              </a:spcBef>
+              <a:spcAft>
+                <a:spcPts val="1000"/>
+              </a:spcAft>
+              <a:buNone/>
+            </a:pPr>
+            <a:r>
+              <a:rPr lang="en"/>
+              <a:t>When creating the Huffman tree there are three cases for A and B.</a:t>
+            </a:r>
+          </a:p>
+          <a:p>
+            <a:pPr lvl="0" rtl="0">
+              <a:spcBef>
+                <a:spcPts val="0"/>
+              </a:spcBef>
+              <a:spcAft>
+                <a:spcPts val="1000"/>
+              </a:spcAft>
+              <a:buNone/>
+            </a:pPr>
+            <a:r>
+              <a:rPr lang="en"/>
+              <a:t>1. </a:t>
+            </a:r>
+            <a:r>
+              <a:rPr lang="en"/>
+              <a:t>A and B are the smallest values (Base Case):</a:t>
+            </a:r>
+          </a:p>
+          <a:p>
+            <a:pPr indent="0" lvl="0" marL="0" rtl="0">
+              <a:spcBef>
+                <a:spcPts val="0"/>
+              </a:spcBef>
+              <a:spcAft>
+                <a:spcPts val="1000"/>
+              </a:spcAft>
+              <a:buNone/>
+            </a:pPr>
+            <a:r>
+              <a:rPr lang="en"/>
+              <a:t>	If A and B are merged, then they will have the same length.</a:t>
+            </a:r>
+          </a:p>
+          <a:p>
+            <a:pPr indent="0" lvl="0" marL="0" rtl="0">
+              <a:spcBef>
+                <a:spcPts val="0"/>
+              </a:spcBef>
+              <a:spcAft>
+                <a:spcPts val="1000"/>
+              </a:spcAft>
+              <a:buNone/>
+            </a:pPr>
+            <a:r>
+              <a:rPr lang="en"/>
+              <a:t>2. B is one of the two smallest values while A is not:</a:t>
+            </a:r>
+          </a:p>
+          <a:p>
+            <a:pPr indent="0" lvl="0" marL="0" rtl="0">
+              <a:spcBef>
+                <a:spcPts val="0"/>
+              </a:spcBef>
+              <a:spcAft>
+                <a:spcPts val="1000"/>
+              </a:spcAft>
+              <a:buNone/>
+            </a:pPr>
+            <a:r>
+              <a:rPr lang="en"/>
+              <a:t>	Case 1:  B gets merged into a tree. </a:t>
+            </a:r>
+          </a:p>
+          <a:p>
+            <a:pPr indent="457200" lvl="0" marL="457200" rtl="0">
+              <a:spcBef>
+                <a:spcPts val="0"/>
+              </a:spcBef>
+              <a:spcAft>
+                <a:spcPts val="1000"/>
+              </a:spcAft>
+              <a:buNone/>
+            </a:pPr>
+            <a:r>
+              <a:rPr lang="en"/>
+              <a:t>This keeps happening until the tree with B gets merged with A. Since A gets merged with this tree we know that A will have the same depth as the parent node of the tree. So B will have a larger depth than the parent node, which means that the length of B is greater than A.</a:t>
+            </a:r>
+          </a:p>
+          <a:p>
+            <a:pPr indent="0" lvl="0" marL="0">
+              <a:spcBef>
+                <a:spcPts val="0"/>
+              </a:spcBef>
+              <a:spcAft>
+                <a:spcPts val="0"/>
+              </a:spcAft>
+              <a:buNone/>
+            </a:pPr>
+            <a:r>
+              <a:t/>
+            </a:r>
+            <a:endParaRPr sz="1400"/>
+          </a:p>
+          <a:p>
+            <a:pPr lvl="0">
+              <a:spcBef>
+                <a:spcPts val="0"/>
+              </a:spcBef>
+              <a:spcAft>
+                <a:spcPts val="0"/>
+              </a:spcAft>
+              <a:buNone/>
+            </a:pPr>
+            <a:r>
+              <a:t/>
+            </a:r>
+            <a:endParaRPr sz="1100"/>
+          </a:p>
+          <a:p>
+            <a:pPr lvl="0">
+              <a:spcBef>
+                <a:spcPts val="0"/>
+              </a:spcBef>
+              <a:spcAft>
+                <a:spcPts val="0"/>
+              </a:spcAft>
+              <a:buNone/>
+            </a:pPr>
+            <a:r>
+              <a:t/>
+            </a:r>
+            <a:endParaRPr sz="1100"/>
           </a:p>
         </p:txBody>
       </p:sp>
@@ -6590,7 +8177,7 @@
   <p:cSld>
     <p:spTree>
       <p:nvGrpSpPr>
-        <p:cNvPr id="82" name="Shape 82"/>
+        <p:cNvPr id="81" name="Shape 81"/>
         <p:cNvGrpSpPr/>
         <p:nvPr/>
       </p:nvGrpSpPr>
@@ -6604,7 +8191,7 @@
       </p:grpSpPr>
       <p:sp>
         <p:nvSpPr>
-          <p:cNvPr id="83" name="Shape 83"/>
+          <p:cNvPr id="82" name="Shape 82"/>
           <p:cNvSpPr txBox="1"/>
           <p:nvPr>
             <p:ph type="title"/>
@@ -6612,28 +8199,104 @@
         </p:nvSpPr>
         <p:spPr>
           <a:xfrm>
-            <a:off x="512700" y="1893300"/>
-            <a:ext cx="8118600" cy="1522800"/>
+            <a:off x="311700" y="445025"/>
+            <a:ext cx="8520600" cy="613200"/>
           </a:xfrm>
           <a:prstGeom prst="rect">
             <a:avLst/>
           </a:prstGeom>
         </p:spPr>
         <p:txBody>
-          <a:bodyPr anchorCtr="0" anchor="b" bIns="91425" lIns="91425" rIns="91425" tIns="91425">
+          <a:bodyPr anchorCtr="0" anchor="t" bIns="91425" lIns="91425" rIns="91425" tIns="91425">
             <a:noAutofit/>
           </a:bodyPr>
           <a:lstStyle/>
           <a:p>
+            <a:pPr lvl="0">
+              <a:spcBef>
+                <a:spcPts val="0"/>
+              </a:spcBef>
+              <a:buClr>
+                <a:schemeClr val="dk1"/>
+              </a:buClr>
+              <a:buSzPct val="36666"/>
+              <a:buFont typeface="Arial"/>
+              <a:buNone/>
+            </a:pPr>
+            <a:r>
+              <a:rPr lang="en"/>
+              <a:t>Huffman Encoding Induction Proof	</a:t>
+            </a:r>
+          </a:p>
+          <a:p>
+            <a:pPr lvl="0">
+              <a:spcBef>
+                <a:spcPts val="0"/>
+              </a:spcBef>
+              <a:buNone/>
+            </a:pPr>
+            <a:r>
+              <a:t/>
+            </a:r>
+            <a:endParaRPr/>
+          </a:p>
+        </p:txBody>
+      </p:sp>
+      <p:sp>
+        <p:nvSpPr>
+          <p:cNvPr id="83" name="Shape 83"/>
+          <p:cNvSpPr txBox="1"/>
+          <p:nvPr>
+            <p:ph idx="1" type="body"/>
+          </p:nvPr>
+        </p:nvSpPr>
+        <p:spPr>
+          <a:xfrm>
+            <a:off x="311700" y="1171600"/>
+            <a:ext cx="8520600" cy="3397200"/>
+          </a:xfrm>
+          <a:prstGeom prst="rect">
+            <a:avLst/>
+          </a:prstGeom>
+        </p:spPr>
+        <p:txBody>
+          <a:bodyPr anchorCtr="0" anchor="t" bIns="91425" lIns="91425" rIns="91425" tIns="91425">
+            <a:noAutofit/>
+          </a:bodyPr>
+          <a:lstStyle/>
+          <a:p>
             <a:pPr lvl="0" rtl="0">
               <a:spcBef>
                 <a:spcPts val="0"/>
               </a:spcBef>
+              <a:spcAft>
+                <a:spcPts val="0"/>
+              </a:spcAft>
               <a:buNone/>
             </a:pPr>
             <a:r>
               <a:rPr lang="en"/>
-              <a:t>Ordered Matrix Search</a:t>
+              <a:t>	Case 2:  A gets merged with tree or value. </a:t>
+            </a:r>
+          </a:p>
+          <a:p>
+            <a:pPr indent="387350" lvl="0" marL="457200" rtl="0">
+              <a:spcBef>
+                <a:spcPts val="0"/>
+              </a:spcBef>
+              <a:spcAft>
+                <a:spcPts val="0"/>
+              </a:spcAft>
+              <a:buClr>
+                <a:schemeClr val="dk1"/>
+              </a:buClr>
+              <a:buSzPct val="61111"/>
+              <a:buFont typeface="Arial"/>
+              <a:buNone/>
+            </a:pPr>
+            <a:r>
+              <a:rPr lang="en"/>
+              <a:t>If this occurs the tree with B in, then it must have been greater than A. After the merge, it will be less than the tree with A because the tree of B is the sum of two smaller values while the tree of A is the sum of two larger values. This can keep happening, but the difference between the depth of A and B will at most be 1. The tree of B must have at least a depth of 1. Since the lowest possible depth for B in its tree is 1 and the highest difference of depth A between B’s tree is 1, this will add up to a max difference of 0. All the other cases will have B at a lower depth. </a:t>
             </a:r>
           </a:p>
         </p:txBody>
@@ -6686,16 +8349,33 @@
           </a:bodyPr>
           <a:lstStyle/>
           <a:p>
-            <a:pPr lvl="0">
-              <a:spcBef>
-                <a:spcPts val="0"/>
-              </a:spcBef>
+            <a:pPr lvl="0" rtl="0">
+              <a:spcBef>
+                <a:spcPts val="0"/>
+              </a:spcBef>
+              <a:buClr>
+                <a:schemeClr val="dk1"/>
+              </a:buClr>
+              <a:buSzPct val="36666"/>
+              <a:buFont typeface="Arial"/>
               <a:buNone/>
             </a:pPr>
             <a:r>
               <a:rPr lang="en"/>
-              <a:t>Finding Element in n x n Matrix</a:t>
-            </a:r>
+              <a:t>Huffman Encoding Induction Proof	</a:t>
+            </a:r>
+          </a:p>
+          <a:p>
+            <a:pPr lvl="0" rtl="0">
+              <a:spcBef>
+                <a:spcPts val="0"/>
+              </a:spcBef>
+              <a:buNone/>
+            </a:pPr>
+            <a:r>
+              <a:t/>
+            </a:r>
+            <a:endParaRPr/>
           </a:p>
         </p:txBody>
       </p:sp>
@@ -6722,6 +8402,224 @@
           </a:bodyPr>
           <a:lstStyle/>
           <a:p>
+            <a:pPr lvl="0" rtl="0">
+              <a:spcBef>
+                <a:spcPts val="0"/>
+              </a:spcBef>
+              <a:spcAft>
+                <a:spcPts val="0"/>
+              </a:spcAft>
+              <a:buClr>
+                <a:schemeClr val="dk1"/>
+              </a:buClr>
+              <a:buSzPct val="61111"/>
+              <a:buFont typeface="Arial"/>
+              <a:buNone/>
+            </a:pPr>
+            <a:r>
+              <a:rPr lang="en"/>
+              <a:t>3. If A and B are both not the smallest values(Induction Hypothesis):</a:t>
+            </a:r>
+          </a:p>
+          <a:p>
+            <a:pPr lvl="0" rtl="0">
+              <a:spcBef>
+                <a:spcPts val="0"/>
+              </a:spcBef>
+              <a:spcAft>
+                <a:spcPts val="0"/>
+              </a:spcAft>
+              <a:buClr>
+                <a:schemeClr val="dk1"/>
+              </a:buClr>
+              <a:buSzPct val="61111"/>
+              <a:buFont typeface="Arial"/>
+              <a:buNone/>
+            </a:pPr>
+            <a:r>
+              <a:t/>
+            </a:r>
+            <a:endParaRPr/>
+          </a:p>
+          <a:p>
+            <a:pPr lvl="0" rtl="0">
+              <a:spcBef>
+                <a:spcPts val="0"/>
+              </a:spcBef>
+              <a:spcAft>
+                <a:spcPts val="0"/>
+              </a:spcAft>
+              <a:buClr>
+                <a:schemeClr val="dk1"/>
+              </a:buClr>
+              <a:buSzPct val="61111"/>
+              <a:buFont typeface="Arial"/>
+              <a:buNone/>
+            </a:pPr>
+            <a:r>
+              <a:rPr lang="en"/>
+              <a:t>	Then the two smallest values are merged and a new Huffman Encoding of size n-1. This can keep occurring until one of the other two steps occurs.</a:t>
+            </a:r>
+          </a:p>
+          <a:p>
+            <a:pPr lvl="0" rtl="0">
+              <a:spcBef>
+                <a:spcPts val="0"/>
+              </a:spcBef>
+              <a:buNone/>
+            </a:pPr>
+            <a:r>
+              <a:t/>
+            </a:r>
+            <a:endParaRPr/>
+          </a:p>
+        </p:txBody>
+      </p:sp>
+    </p:spTree>
+  </p:cSld>
+  <p:clrMapOvr>
+    <a:masterClrMapping/>
+  </p:clrMapOvr>
+</p:sld>
+</file>
+
+<file path=ppt/slides/slide7.xml><?xml version="1.0" encoding="utf-8"?>
+<p:sld xmlns:a="http://schemas.openxmlformats.org/drawingml/2006/main" xmlns:r="http://schemas.openxmlformats.org/officeDocument/2006/relationships" xmlns:mc="http://schemas.openxmlformats.org/markup-compatibility/2006" xmlns:mv="urn:schemas-microsoft-com:mac:vml" xmlns:p="http://schemas.openxmlformats.org/presentationml/2006/main" xmlns:c="http://schemas.openxmlformats.org/drawingml/2006/chart" xmlns:dgm="http://schemas.openxmlformats.org/drawingml/2006/diagram" xmlns:o="urn:schemas-microsoft-com:office:office" xmlns:v="urn:schemas-microsoft-com:vml" xmlns:pvml="urn:schemas-microsoft-com:office:powerpoint" xmlns:com="http://schemas.openxmlformats.org/drawingml/2006/compatibility" xmlns:p14="http://schemas.microsoft.com/office/powerpoint/2010/main">
+  <p:cSld>
+    <p:spTree>
+      <p:nvGrpSpPr>
+        <p:cNvPr id="93" name="Shape 93"/>
+        <p:cNvGrpSpPr/>
+        <p:nvPr/>
+      </p:nvGrpSpPr>
+      <p:grpSpPr>
+        <a:xfrm>
+          <a:off x="0" y="0"/>
+          <a:ext cx="0" cy="0"/>
+          <a:chOff x="0" y="0"/>
+          <a:chExt cx="0" cy="0"/>
+        </a:xfrm>
+      </p:grpSpPr>
+      <p:sp>
+        <p:nvSpPr>
+          <p:cNvPr id="94" name="Shape 94"/>
+          <p:cNvSpPr txBox="1"/>
+          <p:nvPr>
+            <p:ph type="title"/>
+          </p:nvPr>
+        </p:nvSpPr>
+        <p:spPr>
+          <a:xfrm>
+            <a:off x="512700" y="1893300"/>
+            <a:ext cx="8118600" cy="1522800"/>
+          </a:xfrm>
+          <a:prstGeom prst="rect">
+            <a:avLst/>
+          </a:prstGeom>
+        </p:spPr>
+        <p:txBody>
+          <a:bodyPr anchorCtr="0" anchor="b" bIns="91425" lIns="91425" rIns="91425" tIns="91425">
+            <a:noAutofit/>
+          </a:bodyPr>
+          <a:lstStyle/>
+          <a:p>
+            <a:pPr lvl="0" rtl="0">
+              <a:spcBef>
+                <a:spcPts val="0"/>
+              </a:spcBef>
+              <a:buNone/>
+            </a:pPr>
+            <a:r>
+              <a:rPr lang="en"/>
+              <a:t>Ordered Matrix Search</a:t>
+            </a:r>
+          </a:p>
+        </p:txBody>
+      </p:sp>
+    </p:spTree>
+  </p:cSld>
+  <p:clrMapOvr>
+    <a:masterClrMapping/>
+  </p:clrMapOvr>
+</p:sld>
+</file>
+
+<file path=ppt/slides/slide8.xml><?xml version="1.0" encoding="utf-8"?>
+<p:sld xmlns:a="http://schemas.openxmlformats.org/drawingml/2006/main" xmlns:r="http://schemas.openxmlformats.org/officeDocument/2006/relationships" xmlns:mc="http://schemas.openxmlformats.org/markup-compatibility/2006" xmlns:mv="urn:schemas-microsoft-com:mac:vml" xmlns:p="http://schemas.openxmlformats.org/presentationml/2006/main" xmlns:c="http://schemas.openxmlformats.org/drawingml/2006/chart" xmlns:dgm="http://schemas.openxmlformats.org/drawingml/2006/diagram" xmlns:o="urn:schemas-microsoft-com:office:office" xmlns:v="urn:schemas-microsoft-com:vml" xmlns:pvml="urn:schemas-microsoft-com:office:powerpoint" xmlns:com="http://schemas.openxmlformats.org/drawingml/2006/compatibility" xmlns:p14="http://schemas.microsoft.com/office/powerpoint/2010/main">
+  <p:cSld>
+    <p:spTree>
+      <p:nvGrpSpPr>
+        <p:cNvPr id="98" name="Shape 98"/>
+        <p:cNvGrpSpPr/>
+        <p:nvPr/>
+      </p:nvGrpSpPr>
+      <p:grpSpPr>
+        <a:xfrm>
+          <a:off x="0" y="0"/>
+          <a:ext cx="0" cy="0"/>
+          <a:chOff x="0" y="0"/>
+          <a:chExt cx="0" cy="0"/>
+        </a:xfrm>
+      </p:grpSpPr>
+      <p:sp>
+        <p:nvSpPr>
+          <p:cNvPr id="99" name="Shape 99"/>
+          <p:cNvSpPr txBox="1"/>
+          <p:nvPr>
+            <p:ph type="title"/>
+          </p:nvPr>
+        </p:nvSpPr>
+        <p:spPr>
+          <a:xfrm>
+            <a:off x="311700" y="445025"/>
+            <a:ext cx="8520600" cy="613200"/>
+          </a:xfrm>
+          <a:prstGeom prst="rect">
+            <a:avLst/>
+          </a:prstGeom>
+        </p:spPr>
+        <p:txBody>
+          <a:bodyPr anchorCtr="0" anchor="t" bIns="91425" lIns="91425" rIns="91425" tIns="91425">
+            <a:noAutofit/>
+          </a:bodyPr>
+          <a:lstStyle/>
+          <a:p>
+            <a:pPr lvl="0">
+              <a:spcBef>
+                <a:spcPts val="0"/>
+              </a:spcBef>
+              <a:buNone/>
+            </a:pPr>
+            <a:r>
+              <a:rPr lang="en"/>
+              <a:t>Finding Element in n x n Matrix</a:t>
+            </a:r>
+          </a:p>
+        </p:txBody>
+      </p:sp>
+      <p:sp>
+        <p:nvSpPr>
+          <p:cNvPr id="100" name="Shape 100"/>
+          <p:cNvSpPr txBox="1"/>
+          <p:nvPr>
+            <p:ph idx="1" type="body"/>
+          </p:nvPr>
+        </p:nvSpPr>
+        <p:spPr>
+          <a:xfrm>
+            <a:off x="311700" y="1171600"/>
+            <a:ext cx="8520600" cy="3397200"/>
+          </a:xfrm>
+          <a:prstGeom prst="rect">
+            <a:avLst/>
+          </a:prstGeom>
+        </p:spPr>
+        <p:txBody>
+          <a:bodyPr anchorCtr="0" anchor="t" bIns="91425" lIns="91425" rIns="91425" tIns="91425">
+            <a:noAutofit/>
+          </a:bodyPr>
+          <a:lstStyle/>
+          <a:p>
             <a:pPr indent="-228600" lvl="0" marL="457200" rtl="0">
               <a:spcBef>
                 <a:spcPts val="0"/>
@@ -6825,7 +8723,7 @@
       </p:sp>
       <p:pic>
         <p:nvPicPr>
-          <p:cNvPr id="90" name="Shape 90"/>
+          <p:cNvPr id="101" name="Shape 101"/>
           <p:cNvPicPr preferRelativeResize="0"/>
           <p:nvPr/>
         </p:nvPicPr>
@@ -6859,12 +8757,12 @@
 </p:sld>
 </file>
 
-<file path=ppt/slides/slide7.xml><?xml version="1.0" encoding="utf-8"?>
+<file path=ppt/slides/slide9.xml><?xml version="1.0" encoding="utf-8"?>
 <p:sld xmlns:a="http://schemas.openxmlformats.org/drawingml/2006/main" xmlns:r="http://schemas.openxmlformats.org/officeDocument/2006/relationships" xmlns:mc="http://schemas.openxmlformats.org/markup-compatibility/2006" xmlns:mv="urn:schemas-microsoft-com:mac:vml" xmlns:p="http://schemas.openxmlformats.org/presentationml/2006/main" xmlns:c="http://schemas.openxmlformats.org/drawingml/2006/chart" xmlns:dgm="http://schemas.openxmlformats.org/drawingml/2006/diagram" xmlns:o="urn:schemas-microsoft-com:office:office" xmlns:v="urn:schemas-microsoft-com:vml" xmlns:pvml="urn:schemas-microsoft-com:office:powerpoint" xmlns:com="http://schemas.openxmlformats.org/drawingml/2006/compatibility" xmlns:p14="http://schemas.microsoft.com/office/powerpoint/2010/main">
   <p:cSld>
     <p:spTree>
       <p:nvGrpSpPr>
-        <p:cNvPr id="94" name="Shape 94"/>
+        <p:cNvPr id="105" name="Shape 105"/>
         <p:cNvGrpSpPr/>
         <p:nvPr/>
       </p:nvGrpSpPr>
@@ -6878,7 +8776,7 @@
       </p:grpSpPr>
       <p:sp>
         <p:nvSpPr>
-          <p:cNvPr id="95" name="Shape 95"/>
+          <p:cNvPr id="106" name="Shape 106"/>
           <p:cNvSpPr txBox="1"/>
           <p:nvPr>
             <p:ph type="title"/>
@@ -6914,7 +8812,7 @@
       </p:sp>
       <p:sp>
         <p:nvSpPr>
-          <p:cNvPr id="96" name="Shape 96"/>
+          <p:cNvPr id="107" name="Shape 107"/>
           <p:cNvSpPr txBox="1"/>
           <p:nvPr>
             <p:ph idx="1" type="body"/>
@@ -8847,1252 +10745,6 @@
           </a:p>
           <a:p>
             <a:pPr lvl="0">
-              <a:spcBef>
-                <a:spcPts val="0"/>
-              </a:spcBef>
-              <a:buNone/>
-            </a:pPr>
-            <a:r>
-              <a:t/>
-            </a:r>
-            <a:endParaRPr/>
-          </a:p>
-        </p:txBody>
-      </p:sp>
-    </p:spTree>
-  </p:cSld>
-  <p:clrMapOvr>
-    <a:masterClrMapping/>
-  </p:clrMapOvr>
-</p:sld>
-</file>
-
-<file path=ppt/slides/slide8.xml><?xml version="1.0" encoding="utf-8"?>
-<p:sld xmlns:a="http://schemas.openxmlformats.org/drawingml/2006/main" xmlns:r="http://schemas.openxmlformats.org/officeDocument/2006/relationships" xmlns:mc="http://schemas.openxmlformats.org/markup-compatibility/2006" xmlns:mv="urn:schemas-microsoft-com:mac:vml" xmlns:p="http://schemas.openxmlformats.org/presentationml/2006/main" xmlns:c="http://schemas.openxmlformats.org/drawingml/2006/chart" xmlns:dgm="http://schemas.openxmlformats.org/drawingml/2006/diagram" xmlns:o="urn:schemas-microsoft-com:office:office" xmlns:v="urn:schemas-microsoft-com:vml" xmlns:pvml="urn:schemas-microsoft-com:office:powerpoint" xmlns:com="http://schemas.openxmlformats.org/drawingml/2006/compatibility" xmlns:p14="http://schemas.microsoft.com/office/powerpoint/2010/main">
-  <p:cSld>
-    <p:spTree>
-      <p:nvGrpSpPr>
-        <p:cNvPr id="100" name="Shape 100"/>
-        <p:cNvGrpSpPr/>
-        <p:nvPr/>
-      </p:nvGrpSpPr>
-      <p:grpSpPr>
-        <a:xfrm>
-          <a:off x="0" y="0"/>
-          <a:ext cx="0" cy="0"/>
-          <a:chOff x="0" y="0"/>
-          <a:chExt cx="0" cy="0"/>
-        </a:xfrm>
-      </p:grpSpPr>
-      <p:sp>
-        <p:nvSpPr>
-          <p:cNvPr id="101" name="Shape 101"/>
-          <p:cNvSpPr txBox="1"/>
-          <p:nvPr>
-            <p:ph type="title"/>
-          </p:nvPr>
-        </p:nvSpPr>
-        <p:spPr>
-          <a:xfrm>
-            <a:off x="311700" y="445025"/>
-            <a:ext cx="8520600" cy="613200"/>
-          </a:xfrm>
-          <a:prstGeom prst="rect">
-            <a:avLst/>
-          </a:prstGeom>
-        </p:spPr>
-        <p:txBody>
-          <a:bodyPr anchorCtr="0" anchor="t" bIns="91425" lIns="91425" rIns="91425" tIns="91425">
-            <a:noAutofit/>
-          </a:bodyPr>
-          <a:lstStyle/>
-          <a:p>
-            <a:pPr lvl="0">
-              <a:spcBef>
-                <a:spcPts val="0"/>
-              </a:spcBef>
-              <a:buNone/>
-            </a:pPr>
-            <a:r>
-              <a:rPr lang="en"/>
-              <a:t>Pseudo Code Cont.</a:t>
-            </a:r>
-          </a:p>
-        </p:txBody>
-      </p:sp>
-      <p:sp>
-        <p:nvSpPr>
-          <p:cNvPr id="102" name="Shape 102"/>
-          <p:cNvSpPr txBox="1"/>
-          <p:nvPr>
-            <p:ph idx="1" type="body"/>
-          </p:nvPr>
-        </p:nvSpPr>
-        <p:spPr>
-          <a:xfrm>
-            <a:off x="311700" y="1171600"/>
-            <a:ext cx="8520600" cy="3397200"/>
-          </a:xfrm>
-          <a:prstGeom prst="rect">
-            <a:avLst/>
-          </a:prstGeom>
-        </p:spPr>
-        <p:txBody>
-          <a:bodyPr anchorCtr="0" anchor="t" bIns="91425" lIns="91425" rIns="91425" tIns="91425">
-            <a:noAutofit/>
-          </a:bodyPr>
-          <a:lstStyle/>
-          <a:p>
-            <a:pPr indent="-69850" lvl="0" marL="457200">
-              <a:spcBef>
-                <a:spcPts val="0"/>
-              </a:spcBef>
-              <a:spcAft>
-                <a:spcPts val="0"/>
-              </a:spcAft>
-              <a:buClr>
-                <a:schemeClr val="dk1"/>
-              </a:buClr>
-              <a:buSzPct val="68750"/>
-              <a:buFont typeface="Arial"/>
-              <a:buNone/>
-            </a:pPr>
-            <a:r>
-              <a:rPr lang="en" sz="1600">
-                <a:solidFill>
-                  <a:srgbClr val="000088"/>
-                </a:solidFill>
-                <a:latin typeface="Consolas"/>
-                <a:ea typeface="Consolas"/>
-                <a:cs typeface="Consolas"/>
-                <a:sym typeface="Consolas"/>
-              </a:rPr>
-              <a:t>if</a:t>
-            </a:r>
-            <a:r>
-              <a:rPr lang="en" sz="1600">
-                <a:solidFill>
-                  <a:schemeClr val="dk1"/>
-                </a:solidFill>
-                <a:latin typeface="Consolas"/>
-                <a:ea typeface="Consolas"/>
-                <a:cs typeface="Consolas"/>
-                <a:sym typeface="Consolas"/>
-              </a:rPr>
-              <a:t> A</a:t>
-            </a:r>
-            <a:r>
-              <a:rPr lang="en" sz="1600">
-                <a:solidFill>
-                  <a:srgbClr val="666600"/>
-                </a:solidFill>
-                <a:latin typeface="Consolas"/>
-                <a:ea typeface="Consolas"/>
-                <a:cs typeface="Consolas"/>
-                <a:sym typeface="Consolas"/>
-              </a:rPr>
-              <a:t>[</a:t>
-            </a:r>
-            <a:r>
-              <a:rPr lang="en" sz="1600">
-                <a:solidFill>
-                  <a:schemeClr val="dk1"/>
-                </a:solidFill>
-                <a:latin typeface="Consolas"/>
-                <a:ea typeface="Consolas"/>
-                <a:cs typeface="Consolas"/>
-                <a:sym typeface="Consolas"/>
-              </a:rPr>
-              <a:t>rmed</a:t>
-            </a:r>
-            <a:r>
-              <a:rPr lang="en" sz="1600">
-                <a:solidFill>
-                  <a:srgbClr val="666600"/>
-                </a:solidFill>
-                <a:latin typeface="Consolas"/>
-                <a:ea typeface="Consolas"/>
-                <a:cs typeface="Consolas"/>
-                <a:sym typeface="Consolas"/>
-              </a:rPr>
-              <a:t>][</a:t>
-            </a:r>
-            <a:r>
-              <a:rPr lang="en" sz="1600">
-                <a:solidFill>
-                  <a:schemeClr val="dk1"/>
-                </a:solidFill>
-                <a:latin typeface="Consolas"/>
-                <a:ea typeface="Consolas"/>
-                <a:cs typeface="Consolas"/>
-                <a:sym typeface="Consolas"/>
-              </a:rPr>
-              <a:t>cmed</a:t>
-            </a:r>
-            <a:r>
-              <a:rPr lang="en" sz="1600">
-                <a:solidFill>
-                  <a:srgbClr val="666600"/>
-                </a:solidFill>
-                <a:latin typeface="Consolas"/>
-                <a:ea typeface="Consolas"/>
-                <a:cs typeface="Consolas"/>
-                <a:sym typeface="Consolas"/>
-              </a:rPr>
-              <a:t>]</a:t>
-            </a:r>
-            <a:r>
-              <a:rPr lang="en" sz="1600">
-                <a:solidFill>
-                  <a:schemeClr val="dk1"/>
-                </a:solidFill>
-                <a:latin typeface="Consolas"/>
-                <a:ea typeface="Consolas"/>
-                <a:cs typeface="Consolas"/>
-                <a:sym typeface="Consolas"/>
-              </a:rPr>
-              <a:t> </a:t>
-            </a:r>
-            <a:r>
-              <a:rPr lang="en" sz="1600">
-                <a:solidFill>
-                  <a:srgbClr val="666600"/>
-                </a:solidFill>
-                <a:latin typeface="Consolas"/>
-                <a:ea typeface="Consolas"/>
-                <a:cs typeface="Consolas"/>
-                <a:sym typeface="Consolas"/>
-              </a:rPr>
-              <a:t>&gt;</a:t>
-            </a:r>
-            <a:r>
-              <a:rPr lang="en" sz="1600">
-                <a:solidFill>
-                  <a:schemeClr val="dk1"/>
-                </a:solidFill>
-                <a:latin typeface="Consolas"/>
-                <a:ea typeface="Consolas"/>
-                <a:cs typeface="Consolas"/>
-                <a:sym typeface="Consolas"/>
-              </a:rPr>
-              <a:t> x:</a:t>
-            </a:r>
-          </a:p>
-          <a:p>
-            <a:pPr indent="-69850" lvl="0" marL="457200">
-              <a:spcBef>
-                <a:spcPts val="0"/>
-              </a:spcBef>
-              <a:spcAft>
-                <a:spcPts val="0"/>
-              </a:spcAft>
-              <a:buClr>
-                <a:schemeClr val="dk1"/>
-              </a:buClr>
-              <a:buSzPct val="68750"/>
-              <a:buFont typeface="Arial"/>
-              <a:buNone/>
-            </a:pPr>
-            <a:r>
-              <a:rPr lang="en" sz="1600">
-                <a:solidFill>
-                  <a:schemeClr val="dk1"/>
-                </a:solidFill>
-                <a:latin typeface="Consolas"/>
-                <a:ea typeface="Consolas"/>
-                <a:cs typeface="Consolas"/>
-                <a:sym typeface="Consolas"/>
-              </a:rPr>
-              <a:t>	res </a:t>
-            </a:r>
-            <a:r>
-              <a:rPr lang="en" sz="1600">
-                <a:solidFill>
-                  <a:srgbClr val="666600"/>
-                </a:solidFill>
-                <a:latin typeface="Consolas"/>
-                <a:ea typeface="Consolas"/>
-                <a:cs typeface="Consolas"/>
-                <a:sym typeface="Consolas"/>
-              </a:rPr>
-              <a:t>=</a:t>
-            </a:r>
-            <a:r>
-              <a:rPr lang="en" sz="1600">
-                <a:solidFill>
-                  <a:schemeClr val="dk1"/>
-                </a:solidFill>
-                <a:latin typeface="Consolas"/>
-                <a:ea typeface="Consolas"/>
-                <a:cs typeface="Consolas"/>
-                <a:sym typeface="Consolas"/>
-              </a:rPr>
-              <a:t> findX</a:t>
-            </a:r>
-            <a:r>
-              <a:rPr lang="en" sz="1600">
-                <a:solidFill>
-                  <a:srgbClr val="666600"/>
-                </a:solidFill>
-                <a:latin typeface="Consolas"/>
-                <a:ea typeface="Consolas"/>
-                <a:cs typeface="Consolas"/>
-                <a:sym typeface="Consolas"/>
-              </a:rPr>
-              <a:t>(</a:t>
-            </a:r>
-            <a:r>
-              <a:rPr lang="en" sz="1600">
-                <a:solidFill>
-                  <a:schemeClr val="dk1"/>
-                </a:solidFill>
-                <a:latin typeface="Consolas"/>
-                <a:ea typeface="Consolas"/>
-                <a:cs typeface="Consolas"/>
-                <a:sym typeface="Consolas"/>
-              </a:rPr>
-              <a:t>A</a:t>
-            </a:r>
-            <a:r>
-              <a:rPr lang="en" sz="1600">
-                <a:solidFill>
-                  <a:srgbClr val="666600"/>
-                </a:solidFill>
-                <a:latin typeface="Consolas"/>
-                <a:ea typeface="Consolas"/>
-                <a:cs typeface="Consolas"/>
-                <a:sym typeface="Consolas"/>
-              </a:rPr>
-              <a:t>,</a:t>
-            </a:r>
-            <a:r>
-              <a:rPr lang="en" sz="1600">
-                <a:solidFill>
-                  <a:schemeClr val="dk1"/>
-                </a:solidFill>
-                <a:latin typeface="Consolas"/>
-                <a:ea typeface="Consolas"/>
-                <a:cs typeface="Consolas"/>
-                <a:sym typeface="Consolas"/>
-              </a:rPr>
-              <a:t> r</a:t>
-            </a:r>
-            <a:r>
-              <a:rPr lang="en" sz="1600">
-                <a:solidFill>
-                  <a:srgbClr val="666600"/>
-                </a:solidFill>
-                <a:latin typeface="Consolas"/>
-                <a:ea typeface="Consolas"/>
-                <a:cs typeface="Consolas"/>
-                <a:sym typeface="Consolas"/>
-              </a:rPr>
-              <a:t>,</a:t>
-            </a:r>
-            <a:r>
-              <a:rPr lang="en" sz="1600">
-                <a:solidFill>
-                  <a:schemeClr val="dk1"/>
-                </a:solidFill>
-                <a:latin typeface="Consolas"/>
-                <a:ea typeface="Consolas"/>
-                <a:cs typeface="Consolas"/>
-                <a:sym typeface="Consolas"/>
-              </a:rPr>
-              <a:t> rmed</a:t>
-            </a:r>
-            <a:r>
-              <a:rPr lang="en" sz="1600">
-                <a:solidFill>
-                  <a:srgbClr val="666600"/>
-                </a:solidFill>
-                <a:latin typeface="Consolas"/>
-                <a:ea typeface="Consolas"/>
-                <a:cs typeface="Consolas"/>
-                <a:sym typeface="Consolas"/>
-              </a:rPr>
-              <a:t>,</a:t>
-            </a:r>
-            <a:r>
-              <a:rPr lang="en" sz="1600">
-                <a:solidFill>
-                  <a:schemeClr val="dk1"/>
-                </a:solidFill>
-                <a:latin typeface="Consolas"/>
-                <a:ea typeface="Consolas"/>
-                <a:cs typeface="Consolas"/>
-                <a:sym typeface="Consolas"/>
-              </a:rPr>
-              <a:t> c</a:t>
-            </a:r>
-            <a:r>
-              <a:rPr lang="en" sz="1600">
-                <a:solidFill>
-                  <a:srgbClr val="666600"/>
-                </a:solidFill>
-                <a:latin typeface="Consolas"/>
-                <a:ea typeface="Consolas"/>
-                <a:cs typeface="Consolas"/>
-                <a:sym typeface="Consolas"/>
-              </a:rPr>
-              <a:t>,</a:t>
-            </a:r>
-            <a:r>
-              <a:rPr lang="en" sz="1600">
-                <a:solidFill>
-                  <a:schemeClr val="dk1"/>
-                </a:solidFill>
-                <a:latin typeface="Consolas"/>
-                <a:ea typeface="Consolas"/>
-                <a:cs typeface="Consolas"/>
-                <a:sym typeface="Consolas"/>
-              </a:rPr>
-              <a:t> cmed</a:t>
-            </a:r>
-            <a:r>
-              <a:rPr lang="en" sz="1600">
-                <a:solidFill>
-                  <a:srgbClr val="666600"/>
-                </a:solidFill>
-                <a:latin typeface="Consolas"/>
-                <a:ea typeface="Consolas"/>
-                <a:cs typeface="Consolas"/>
-                <a:sym typeface="Consolas"/>
-              </a:rPr>
-              <a:t>,</a:t>
-            </a:r>
-            <a:r>
-              <a:rPr lang="en" sz="1600">
-                <a:solidFill>
-                  <a:schemeClr val="dk1"/>
-                </a:solidFill>
-                <a:latin typeface="Consolas"/>
-                <a:ea typeface="Consolas"/>
-                <a:cs typeface="Consolas"/>
-                <a:sym typeface="Consolas"/>
-              </a:rPr>
-              <a:t> x)</a:t>
-            </a:r>
-          </a:p>
-          <a:p>
-            <a:pPr indent="-69850" lvl="0" marL="457200" rtl="0">
-              <a:spcBef>
-                <a:spcPts val="0"/>
-              </a:spcBef>
-              <a:spcAft>
-                <a:spcPts val="0"/>
-              </a:spcAft>
-              <a:buClr>
-                <a:schemeClr val="dk1"/>
-              </a:buClr>
-              <a:buSzPct val="68750"/>
-              <a:buFont typeface="Arial"/>
-              <a:buNone/>
-            </a:pPr>
-            <a:r>
-              <a:rPr lang="en" sz="1600">
-                <a:solidFill>
-                  <a:schemeClr val="dk1"/>
-                </a:solidFill>
-                <a:latin typeface="Consolas"/>
-                <a:ea typeface="Consolas"/>
-                <a:cs typeface="Consolas"/>
-                <a:sym typeface="Consolas"/>
-              </a:rPr>
-              <a:t>	</a:t>
-            </a:r>
-            <a:r>
-              <a:rPr i="1" lang="en" sz="1600">
-                <a:solidFill>
-                  <a:srgbClr val="000088"/>
-                </a:solidFill>
-                <a:latin typeface="Consolas"/>
-                <a:ea typeface="Consolas"/>
-                <a:cs typeface="Consolas"/>
-                <a:sym typeface="Consolas"/>
-              </a:rPr>
-              <a:t>return res if not equal -1</a:t>
-            </a:r>
-          </a:p>
-          <a:p>
-            <a:pPr indent="-69850" lvl="0" marL="457200">
-              <a:spcBef>
-                <a:spcPts val="0"/>
-              </a:spcBef>
-              <a:spcAft>
-                <a:spcPts val="0"/>
-              </a:spcAft>
-              <a:buClr>
-                <a:schemeClr val="dk1"/>
-              </a:buClr>
-              <a:buSzPct val="68750"/>
-              <a:buFont typeface="Arial"/>
-              <a:buNone/>
-            </a:pPr>
-            <a:r>
-              <a:rPr lang="en" sz="1600">
-                <a:solidFill>
-                  <a:schemeClr val="dk1"/>
-                </a:solidFill>
-                <a:latin typeface="Consolas"/>
-                <a:ea typeface="Consolas"/>
-                <a:cs typeface="Consolas"/>
-                <a:sym typeface="Consolas"/>
-              </a:rPr>
-              <a:t>	res </a:t>
-            </a:r>
-            <a:r>
-              <a:rPr lang="en" sz="1600">
-                <a:solidFill>
-                  <a:srgbClr val="666600"/>
-                </a:solidFill>
-                <a:latin typeface="Consolas"/>
-                <a:ea typeface="Consolas"/>
-                <a:cs typeface="Consolas"/>
-                <a:sym typeface="Consolas"/>
-              </a:rPr>
-              <a:t>=</a:t>
-            </a:r>
-            <a:r>
-              <a:rPr lang="en" sz="1600">
-                <a:solidFill>
-                  <a:schemeClr val="dk1"/>
-                </a:solidFill>
-                <a:latin typeface="Consolas"/>
-                <a:ea typeface="Consolas"/>
-                <a:cs typeface="Consolas"/>
-                <a:sym typeface="Consolas"/>
-              </a:rPr>
-              <a:t> findX</a:t>
-            </a:r>
-            <a:r>
-              <a:rPr lang="en" sz="1600">
-                <a:solidFill>
-                  <a:srgbClr val="666600"/>
-                </a:solidFill>
-                <a:latin typeface="Consolas"/>
-                <a:ea typeface="Consolas"/>
-                <a:cs typeface="Consolas"/>
-                <a:sym typeface="Consolas"/>
-              </a:rPr>
-              <a:t>(</a:t>
-            </a:r>
-            <a:r>
-              <a:rPr lang="en" sz="1600">
-                <a:solidFill>
-                  <a:schemeClr val="dk1"/>
-                </a:solidFill>
-                <a:latin typeface="Consolas"/>
-                <a:ea typeface="Consolas"/>
-                <a:cs typeface="Consolas"/>
-                <a:sym typeface="Consolas"/>
-              </a:rPr>
-              <a:t>A</a:t>
-            </a:r>
-            <a:r>
-              <a:rPr lang="en" sz="1600">
-                <a:solidFill>
-                  <a:srgbClr val="666600"/>
-                </a:solidFill>
-                <a:latin typeface="Consolas"/>
-                <a:ea typeface="Consolas"/>
-                <a:cs typeface="Consolas"/>
-                <a:sym typeface="Consolas"/>
-              </a:rPr>
-              <a:t>,</a:t>
-            </a:r>
-            <a:r>
-              <a:rPr lang="en" sz="1600">
-                <a:solidFill>
-                  <a:schemeClr val="dk1"/>
-                </a:solidFill>
-                <a:latin typeface="Consolas"/>
-                <a:ea typeface="Consolas"/>
-                <a:cs typeface="Consolas"/>
-                <a:sym typeface="Consolas"/>
-              </a:rPr>
-              <a:t> r</a:t>
-            </a:r>
-            <a:r>
-              <a:rPr lang="en" sz="1600">
-                <a:solidFill>
-                  <a:srgbClr val="666600"/>
-                </a:solidFill>
-                <a:latin typeface="Consolas"/>
-                <a:ea typeface="Consolas"/>
-                <a:cs typeface="Consolas"/>
-                <a:sym typeface="Consolas"/>
-              </a:rPr>
-              <a:t>,</a:t>
-            </a:r>
-            <a:r>
-              <a:rPr lang="en" sz="1600">
-                <a:solidFill>
-                  <a:schemeClr val="dk1"/>
-                </a:solidFill>
-                <a:latin typeface="Consolas"/>
-                <a:ea typeface="Consolas"/>
-                <a:cs typeface="Consolas"/>
-                <a:sym typeface="Consolas"/>
-              </a:rPr>
-              <a:t> rmed</a:t>
-            </a:r>
-            <a:r>
-              <a:rPr lang="en" sz="1600">
-                <a:solidFill>
-                  <a:srgbClr val="666600"/>
-                </a:solidFill>
-                <a:latin typeface="Consolas"/>
-                <a:ea typeface="Consolas"/>
-                <a:cs typeface="Consolas"/>
-                <a:sym typeface="Consolas"/>
-              </a:rPr>
-              <a:t>,</a:t>
-            </a:r>
-            <a:r>
-              <a:rPr lang="en" sz="1600">
-                <a:solidFill>
-                  <a:schemeClr val="dk1"/>
-                </a:solidFill>
-                <a:latin typeface="Consolas"/>
-                <a:ea typeface="Consolas"/>
-                <a:cs typeface="Consolas"/>
-                <a:sym typeface="Consolas"/>
-              </a:rPr>
-              <a:t> cmed</a:t>
-            </a:r>
-            <a:r>
-              <a:rPr lang="en" sz="1600">
-                <a:solidFill>
-                  <a:srgbClr val="666600"/>
-                </a:solidFill>
-                <a:latin typeface="Consolas"/>
-                <a:ea typeface="Consolas"/>
-                <a:cs typeface="Consolas"/>
-                <a:sym typeface="Consolas"/>
-              </a:rPr>
-              <a:t>+</a:t>
-            </a:r>
-            <a:r>
-              <a:rPr lang="en" sz="1600">
-                <a:solidFill>
-                  <a:srgbClr val="006666"/>
-                </a:solidFill>
-                <a:latin typeface="Consolas"/>
-                <a:ea typeface="Consolas"/>
-                <a:cs typeface="Consolas"/>
-                <a:sym typeface="Consolas"/>
-              </a:rPr>
-              <a:t>1</a:t>
-            </a:r>
-            <a:r>
-              <a:rPr lang="en" sz="1600">
-                <a:solidFill>
-                  <a:srgbClr val="666600"/>
-                </a:solidFill>
-                <a:latin typeface="Consolas"/>
-                <a:ea typeface="Consolas"/>
-                <a:cs typeface="Consolas"/>
-                <a:sym typeface="Consolas"/>
-              </a:rPr>
-              <a:t>,</a:t>
-            </a:r>
-            <a:r>
-              <a:rPr lang="en" sz="1600">
-                <a:solidFill>
-                  <a:schemeClr val="dk1"/>
-                </a:solidFill>
-                <a:latin typeface="Consolas"/>
-                <a:ea typeface="Consolas"/>
-                <a:cs typeface="Consolas"/>
-                <a:sym typeface="Consolas"/>
-              </a:rPr>
-              <a:t> clen</a:t>
-            </a:r>
-            <a:r>
-              <a:rPr lang="en" sz="1600">
-                <a:solidFill>
-                  <a:srgbClr val="666600"/>
-                </a:solidFill>
-                <a:latin typeface="Consolas"/>
-                <a:ea typeface="Consolas"/>
-                <a:cs typeface="Consolas"/>
-                <a:sym typeface="Consolas"/>
-              </a:rPr>
-              <a:t>-</a:t>
-            </a:r>
-            <a:r>
-              <a:rPr lang="en" sz="1600">
-                <a:solidFill>
-                  <a:schemeClr val="dk1"/>
-                </a:solidFill>
-                <a:latin typeface="Consolas"/>
-                <a:ea typeface="Consolas"/>
-                <a:cs typeface="Consolas"/>
-                <a:sym typeface="Consolas"/>
-              </a:rPr>
-              <a:t>cmed</a:t>
-            </a:r>
-            <a:r>
-              <a:rPr lang="en" sz="1600">
-                <a:solidFill>
-                  <a:srgbClr val="666600"/>
-                </a:solidFill>
-                <a:latin typeface="Consolas"/>
-                <a:ea typeface="Consolas"/>
-                <a:cs typeface="Consolas"/>
-                <a:sym typeface="Consolas"/>
-              </a:rPr>
-              <a:t>-</a:t>
-            </a:r>
-            <a:r>
-              <a:rPr lang="en" sz="1600">
-                <a:solidFill>
-                  <a:srgbClr val="006666"/>
-                </a:solidFill>
-                <a:latin typeface="Consolas"/>
-                <a:ea typeface="Consolas"/>
-                <a:cs typeface="Consolas"/>
-                <a:sym typeface="Consolas"/>
-              </a:rPr>
-              <a:t>1</a:t>
-            </a:r>
-            <a:r>
-              <a:rPr lang="en" sz="1600">
-                <a:solidFill>
-                  <a:srgbClr val="666600"/>
-                </a:solidFill>
-                <a:latin typeface="Consolas"/>
-                <a:ea typeface="Consolas"/>
-                <a:cs typeface="Consolas"/>
-                <a:sym typeface="Consolas"/>
-              </a:rPr>
-              <a:t>,</a:t>
-            </a:r>
-            <a:r>
-              <a:rPr lang="en" sz="1600">
-                <a:solidFill>
-                  <a:schemeClr val="dk1"/>
-                </a:solidFill>
-                <a:latin typeface="Consolas"/>
-                <a:ea typeface="Consolas"/>
-                <a:cs typeface="Consolas"/>
-                <a:sym typeface="Consolas"/>
-              </a:rPr>
-              <a:t> x)</a:t>
-            </a:r>
-          </a:p>
-          <a:p>
-            <a:pPr indent="-69850" lvl="0" marL="457200" rtl="0">
-              <a:spcBef>
-                <a:spcPts val="0"/>
-              </a:spcBef>
-              <a:spcAft>
-                <a:spcPts val="0"/>
-              </a:spcAft>
-              <a:buClr>
-                <a:schemeClr val="dk1"/>
-              </a:buClr>
-              <a:buSzPct val="68750"/>
-              <a:buFont typeface="Arial"/>
-              <a:buNone/>
-            </a:pPr>
-            <a:r>
-              <a:rPr lang="en" sz="1600">
-                <a:solidFill>
-                  <a:schemeClr val="dk1"/>
-                </a:solidFill>
-                <a:latin typeface="Consolas"/>
-                <a:ea typeface="Consolas"/>
-                <a:cs typeface="Consolas"/>
-                <a:sym typeface="Consolas"/>
-              </a:rPr>
-              <a:t>	</a:t>
-            </a:r>
-            <a:r>
-              <a:rPr i="1" lang="en" sz="1600">
-                <a:solidFill>
-                  <a:srgbClr val="000088"/>
-                </a:solidFill>
-                <a:latin typeface="Consolas"/>
-                <a:ea typeface="Consolas"/>
-                <a:cs typeface="Consolas"/>
-                <a:sym typeface="Consolas"/>
-              </a:rPr>
-              <a:t>return res if not equal -1</a:t>
-            </a:r>
-          </a:p>
-          <a:p>
-            <a:pPr indent="-69850" lvl="0" marL="457200">
-              <a:spcBef>
-                <a:spcPts val="0"/>
-              </a:spcBef>
-              <a:spcAft>
-                <a:spcPts val="0"/>
-              </a:spcAft>
-              <a:buClr>
-                <a:schemeClr val="dk1"/>
-              </a:buClr>
-              <a:buSzPct val="68750"/>
-              <a:buFont typeface="Arial"/>
-              <a:buNone/>
-            </a:pPr>
-            <a:r>
-              <a:rPr lang="en" sz="1600">
-                <a:solidFill>
-                  <a:schemeClr val="dk1"/>
-                </a:solidFill>
-                <a:latin typeface="Consolas"/>
-                <a:ea typeface="Consolas"/>
-                <a:cs typeface="Consolas"/>
-                <a:sym typeface="Consolas"/>
-              </a:rPr>
-              <a:t>	res </a:t>
-            </a:r>
-            <a:r>
-              <a:rPr lang="en" sz="1600">
-                <a:solidFill>
-                  <a:srgbClr val="666600"/>
-                </a:solidFill>
-                <a:latin typeface="Consolas"/>
-                <a:ea typeface="Consolas"/>
-                <a:cs typeface="Consolas"/>
-                <a:sym typeface="Consolas"/>
-              </a:rPr>
-              <a:t>=</a:t>
-            </a:r>
-            <a:r>
-              <a:rPr lang="en" sz="1600">
-                <a:solidFill>
-                  <a:schemeClr val="dk1"/>
-                </a:solidFill>
-                <a:latin typeface="Consolas"/>
-                <a:ea typeface="Consolas"/>
-                <a:cs typeface="Consolas"/>
-                <a:sym typeface="Consolas"/>
-              </a:rPr>
-              <a:t> findX</a:t>
-            </a:r>
-            <a:r>
-              <a:rPr lang="en" sz="1600">
-                <a:solidFill>
-                  <a:srgbClr val="666600"/>
-                </a:solidFill>
-                <a:latin typeface="Consolas"/>
-                <a:ea typeface="Consolas"/>
-                <a:cs typeface="Consolas"/>
-                <a:sym typeface="Consolas"/>
-              </a:rPr>
-              <a:t>(</a:t>
-            </a:r>
-            <a:r>
-              <a:rPr lang="en" sz="1600">
-                <a:solidFill>
-                  <a:schemeClr val="dk1"/>
-                </a:solidFill>
-                <a:latin typeface="Consolas"/>
-                <a:ea typeface="Consolas"/>
-                <a:cs typeface="Consolas"/>
-                <a:sym typeface="Consolas"/>
-              </a:rPr>
-              <a:t>A</a:t>
-            </a:r>
-            <a:r>
-              <a:rPr lang="en" sz="1600">
-                <a:solidFill>
-                  <a:srgbClr val="666600"/>
-                </a:solidFill>
-                <a:latin typeface="Consolas"/>
-                <a:ea typeface="Consolas"/>
-                <a:cs typeface="Consolas"/>
-                <a:sym typeface="Consolas"/>
-              </a:rPr>
-              <a:t>,</a:t>
-            </a:r>
-            <a:r>
-              <a:rPr lang="en" sz="1600">
-                <a:solidFill>
-                  <a:schemeClr val="dk1"/>
-                </a:solidFill>
-                <a:latin typeface="Consolas"/>
-                <a:ea typeface="Consolas"/>
-                <a:cs typeface="Consolas"/>
-                <a:sym typeface="Consolas"/>
-              </a:rPr>
-              <a:t> rmed</a:t>
-            </a:r>
-            <a:r>
-              <a:rPr lang="en" sz="1600">
-                <a:solidFill>
-                  <a:srgbClr val="666600"/>
-                </a:solidFill>
-                <a:latin typeface="Consolas"/>
-                <a:ea typeface="Consolas"/>
-                <a:cs typeface="Consolas"/>
-                <a:sym typeface="Consolas"/>
-              </a:rPr>
-              <a:t>,</a:t>
-            </a:r>
-            <a:r>
-              <a:rPr lang="en" sz="1600">
-                <a:solidFill>
-                  <a:schemeClr val="dk1"/>
-                </a:solidFill>
-                <a:latin typeface="Consolas"/>
-                <a:ea typeface="Consolas"/>
-                <a:cs typeface="Consolas"/>
-                <a:sym typeface="Consolas"/>
-              </a:rPr>
-              <a:t> rlen</a:t>
-            </a:r>
-            <a:r>
-              <a:rPr lang="en" sz="1600">
-                <a:solidFill>
-                  <a:srgbClr val="666600"/>
-                </a:solidFill>
-                <a:latin typeface="Consolas"/>
-                <a:ea typeface="Consolas"/>
-                <a:cs typeface="Consolas"/>
-                <a:sym typeface="Consolas"/>
-              </a:rPr>
-              <a:t>-</a:t>
-            </a:r>
-            <a:r>
-              <a:rPr lang="en" sz="1600">
-                <a:solidFill>
-                  <a:schemeClr val="dk1"/>
-                </a:solidFill>
-                <a:latin typeface="Consolas"/>
-                <a:ea typeface="Consolas"/>
-                <a:cs typeface="Consolas"/>
-                <a:sym typeface="Consolas"/>
-              </a:rPr>
-              <a:t>rmed</a:t>
-            </a:r>
-            <a:r>
-              <a:rPr lang="en" sz="1600">
-                <a:solidFill>
-                  <a:srgbClr val="666600"/>
-                </a:solidFill>
-                <a:latin typeface="Consolas"/>
-                <a:ea typeface="Consolas"/>
-                <a:cs typeface="Consolas"/>
-                <a:sym typeface="Consolas"/>
-              </a:rPr>
-              <a:t>,</a:t>
-            </a:r>
-            <a:r>
-              <a:rPr lang="en" sz="1600">
-                <a:solidFill>
-                  <a:schemeClr val="dk1"/>
-                </a:solidFill>
-                <a:latin typeface="Consolas"/>
-                <a:ea typeface="Consolas"/>
-                <a:cs typeface="Consolas"/>
-                <a:sym typeface="Consolas"/>
-              </a:rPr>
-              <a:t> c</a:t>
-            </a:r>
-            <a:r>
-              <a:rPr lang="en" sz="1600">
-                <a:solidFill>
-                  <a:srgbClr val="666600"/>
-                </a:solidFill>
-                <a:latin typeface="Consolas"/>
-                <a:ea typeface="Consolas"/>
-                <a:cs typeface="Consolas"/>
-                <a:sym typeface="Consolas"/>
-              </a:rPr>
-              <a:t>,</a:t>
-            </a:r>
-            <a:r>
-              <a:rPr lang="en" sz="1600">
-                <a:solidFill>
-                  <a:schemeClr val="dk1"/>
-                </a:solidFill>
-                <a:latin typeface="Consolas"/>
-                <a:ea typeface="Consolas"/>
-                <a:cs typeface="Consolas"/>
-                <a:sym typeface="Consolas"/>
-              </a:rPr>
-              <a:t> cmed</a:t>
-            </a:r>
-            <a:r>
-              <a:rPr lang="en" sz="1600">
-                <a:solidFill>
-                  <a:srgbClr val="666600"/>
-                </a:solidFill>
-                <a:latin typeface="Consolas"/>
-                <a:ea typeface="Consolas"/>
-                <a:cs typeface="Consolas"/>
-                <a:sym typeface="Consolas"/>
-              </a:rPr>
-              <a:t>,</a:t>
-            </a:r>
-            <a:r>
-              <a:rPr lang="en" sz="1600">
-                <a:solidFill>
-                  <a:schemeClr val="dk1"/>
-                </a:solidFill>
-                <a:latin typeface="Consolas"/>
-                <a:ea typeface="Consolas"/>
-                <a:cs typeface="Consolas"/>
-                <a:sym typeface="Consolas"/>
-              </a:rPr>
-              <a:t> x)</a:t>
-            </a:r>
-          </a:p>
-          <a:p>
-            <a:pPr indent="-69850" lvl="0" marL="457200" rtl="0">
-              <a:spcBef>
-                <a:spcPts val="0"/>
-              </a:spcBef>
-              <a:spcAft>
-                <a:spcPts val="0"/>
-              </a:spcAft>
-              <a:buClr>
-                <a:schemeClr val="dk1"/>
-              </a:buClr>
-              <a:buSzPct val="68750"/>
-              <a:buFont typeface="Arial"/>
-              <a:buNone/>
-            </a:pPr>
-            <a:r>
-              <a:rPr lang="en" sz="1600">
-                <a:solidFill>
-                  <a:schemeClr val="dk1"/>
-                </a:solidFill>
-                <a:latin typeface="Consolas"/>
-                <a:ea typeface="Consolas"/>
-                <a:cs typeface="Consolas"/>
-                <a:sym typeface="Consolas"/>
-              </a:rPr>
-              <a:t>	</a:t>
-            </a:r>
-            <a:r>
-              <a:rPr i="1" lang="en" sz="1600">
-                <a:solidFill>
-                  <a:srgbClr val="000088"/>
-                </a:solidFill>
-                <a:latin typeface="Consolas"/>
-                <a:ea typeface="Consolas"/>
-                <a:cs typeface="Consolas"/>
-                <a:sym typeface="Consolas"/>
-              </a:rPr>
-              <a:t>return res if not equal -1</a:t>
-            </a:r>
-          </a:p>
-          <a:p>
-            <a:pPr lvl="0">
-              <a:spcBef>
-                <a:spcPts val="0"/>
-              </a:spcBef>
-              <a:buNone/>
-            </a:pPr>
-            <a:r>
-              <a:t/>
-            </a:r>
-            <a:endParaRPr/>
-          </a:p>
-        </p:txBody>
-      </p:sp>
-    </p:spTree>
-  </p:cSld>
-  <p:clrMapOvr>
-    <a:masterClrMapping/>
-  </p:clrMapOvr>
-</p:sld>
-</file>
-
-<file path=ppt/slides/slide9.xml><?xml version="1.0" encoding="utf-8"?>
-<p:sld xmlns:a="http://schemas.openxmlformats.org/drawingml/2006/main" xmlns:r="http://schemas.openxmlformats.org/officeDocument/2006/relationships" xmlns:mc="http://schemas.openxmlformats.org/markup-compatibility/2006" xmlns:mv="urn:schemas-microsoft-com:mac:vml" xmlns:p="http://schemas.openxmlformats.org/presentationml/2006/main" xmlns:c="http://schemas.openxmlformats.org/drawingml/2006/chart" xmlns:dgm="http://schemas.openxmlformats.org/drawingml/2006/diagram" xmlns:o="urn:schemas-microsoft-com:office:office" xmlns:v="urn:schemas-microsoft-com:vml" xmlns:pvml="urn:schemas-microsoft-com:office:powerpoint" xmlns:com="http://schemas.openxmlformats.org/drawingml/2006/compatibility" xmlns:p14="http://schemas.microsoft.com/office/powerpoint/2010/main">
-  <p:cSld>
-    <p:spTree>
-      <p:nvGrpSpPr>
-        <p:cNvPr id="106" name="Shape 106"/>
-        <p:cNvGrpSpPr/>
-        <p:nvPr/>
-      </p:nvGrpSpPr>
-      <p:grpSpPr>
-        <a:xfrm>
-          <a:off x="0" y="0"/>
-          <a:ext cx="0" cy="0"/>
-          <a:chOff x="0" y="0"/>
-          <a:chExt cx="0" cy="0"/>
-        </a:xfrm>
-      </p:grpSpPr>
-      <p:sp>
-        <p:nvSpPr>
-          <p:cNvPr id="107" name="Shape 107"/>
-          <p:cNvSpPr txBox="1"/>
-          <p:nvPr>
-            <p:ph type="title"/>
-          </p:nvPr>
-        </p:nvSpPr>
-        <p:spPr>
-          <a:xfrm>
-            <a:off x="311700" y="445025"/>
-            <a:ext cx="8520600" cy="613200"/>
-          </a:xfrm>
-          <a:prstGeom prst="rect">
-            <a:avLst/>
-          </a:prstGeom>
-        </p:spPr>
-        <p:txBody>
-          <a:bodyPr anchorCtr="0" anchor="t" bIns="91425" lIns="91425" rIns="91425" tIns="91425">
-            <a:noAutofit/>
-          </a:bodyPr>
-          <a:lstStyle/>
-          <a:p>
-            <a:pPr lvl="0" rtl="0">
-              <a:spcBef>
-                <a:spcPts val="0"/>
-              </a:spcBef>
-              <a:buNone/>
-            </a:pPr>
-            <a:r>
-              <a:rPr lang="en"/>
-              <a:t>Time Complexity</a:t>
-            </a:r>
-          </a:p>
-        </p:txBody>
-      </p:sp>
-      <p:sp>
-        <p:nvSpPr>
-          <p:cNvPr id="108" name="Shape 108"/>
-          <p:cNvSpPr txBox="1"/>
-          <p:nvPr>
-            <p:ph idx="1" type="body"/>
-          </p:nvPr>
-        </p:nvSpPr>
-        <p:spPr>
-          <a:xfrm>
-            <a:off x="311700" y="1171600"/>
-            <a:ext cx="8520600" cy="3397200"/>
-          </a:xfrm>
-          <a:prstGeom prst="rect">
-            <a:avLst/>
-          </a:prstGeom>
-        </p:spPr>
-        <p:txBody>
-          <a:bodyPr anchorCtr="0" anchor="t" bIns="91425" lIns="91425" rIns="91425" tIns="91425">
-            <a:noAutofit/>
-          </a:bodyPr>
-          <a:lstStyle/>
-          <a:p>
-            <a:pPr lvl="0" rtl="0">
-              <a:spcBef>
-                <a:spcPts val="0"/>
-              </a:spcBef>
-              <a:buNone/>
-            </a:pPr>
-            <a:r>
-              <a:rPr lang="en"/>
-              <a:t>T(N) = 3 T(N / 4) + 1</a:t>
-            </a:r>
-          </a:p>
-          <a:p>
-            <a:pPr lvl="0">
-              <a:spcBef>
-                <a:spcPts val="0"/>
-              </a:spcBef>
-              <a:buNone/>
-            </a:pPr>
-            <a:r>
-              <a:rPr lang="en"/>
-              <a:t>Master Theorem:</a:t>
-            </a:r>
-          </a:p>
-          <a:p>
-            <a:pPr lvl="0">
-              <a:spcBef>
-                <a:spcPts val="0"/>
-              </a:spcBef>
-              <a:buNone/>
-            </a:pPr>
-            <a:r>
-              <a:rPr lang="en"/>
-              <a:t>AT(N/B) +f(N)				A=3, B =4, f(N) = O(1)</a:t>
-            </a:r>
-          </a:p>
-          <a:p>
-            <a:pPr lvl="0">
-              <a:spcBef>
-                <a:spcPts val="0"/>
-              </a:spcBef>
-              <a:buNone/>
-            </a:pPr>
-            <a:r>
-              <a:rPr lang="en"/>
-              <a:t> Since f(N) &lt; O(n^log</a:t>
-            </a:r>
-            <a:r>
-              <a:rPr baseline="-25000" lang="en"/>
-              <a:t>B</a:t>
-            </a:r>
-            <a:r>
-              <a:rPr lang="en"/>
-              <a:t>A)		O(1) &lt; O(n</a:t>
-            </a:r>
-            <a:r>
-              <a:rPr lang="en"/>
-              <a:t>^</a:t>
-            </a:r>
-            <a:r>
-              <a:rPr lang="en"/>
-              <a:t>log</a:t>
-            </a:r>
-            <a:r>
-              <a:rPr baseline="-25000" lang="en"/>
-              <a:t>4</a:t>
-            </a:r>
-            <a:r>
-              <a:rPr lang="en"/>
-              <a:t>3)</a:t>
-            </a:r>
-          </a:p>
-          <a:p>
-            <a:pPr lvl="0" rtl="0">
-              <a:spcBef>
-                <a:spcPts val="0"/>
-              </a:spcBef>
-              <a:buNone/>
-            </a:pPr>
-            <a:r>
-              <a:rPr lang="en"/>
-              <a:t>Time Complexity = O(n^log</a:t>
-            </a:r>
-            <a:r>
-              <a:rPr baseline="-25000" lang="en"/>
-              <a:t>B</a:t>
-            </a:r>
-            <a:r>
-              <a:rPr lang="en"/>
-              <a:t>A)</a:t>
-            </a:r>
-          </a:p>
-          <a:p>
-            <a:pPr lvl="0" rtl="0">
-              <a:spcBef>
-                <a:spcPts val="0"/>
-              </a:spcBef>
-              <a:buNone/>
-            </a:pPr>
-            <a:r>
-              <a:rPr lang="en"/>
-              <a:t>Time Complexity: O(n^log</a:t>
-            </a:r>
-            <a:r>
-              <a:rPr baseline="-25000" lang="en"/>
-              <a:t>4</a:t>
-            </a:r>
-            <a:r>
-              <a:rPr lang="en"/>
-              <a:t>3)</a:t>
-            </a:r>
-          </a:p>
-          <a:p>
-            <a:pPr lvl="0" rtl="0">
               <a:spcBef>
                 <a:spcPts val="0"/>
               </a:spcBef>

</xml_diff>